<commit_message>
modified slides for governance board
https://github.com/OuhscBbmc/prairie-outpost/issues/597

cc: @DavidBard
</commit_message>
<xml_diff>
--- a/publications/presentation-2021-10-governance/crdw-2021-10.pptx
+++ b/publications/presentation-2021-10-governance/crdw-2021-10.pptx
@@ -5,7 +5,7 @@
     <p:sldMasterId id="2147483648" r:id="rId1"/>
   </p:sldMasterIdLst>
   <p:notesMasterIdLst>
-    <p:notesMasterId r:id="rId28"/>
+    <p:notesMasterId r:id="rId29"/>
   </p:notesMasterIdLst>
   <p:sldIdLst>
     <p:sldId id="292" r:id="rId2"/>
@@ -19,21 +19,22 @@
     <p:sldId id="435" r:id="rId10"/>
     <p:sldId id="436" r:id="rId11"/>
     <p:sldId id="437" r:id="rId12"/>
-    <p:sldId id="438" r:id="rId13"/>
-    <p:sldId id="439" r:id="rId14"/>
-    <p:sldId id="401" r:id="rId15"/>
-    <p:sldId id="424" r:id="rId16"/>
-    <p:sldId id="440" r:id="rId17"/>
-    <p:sldId id="391" r:id="rId18"/>
-    <p:sldId id="426" r:id="rId19"/>
-    <p:sldId id="433" r:id="rId20"/>
-    <p:sldId id="427" r:id="rId21"/>
-    <p:sldId id="428" r:id="rId22"/>
-    <p:sldId id="430" r:id="rId23"/>
-    <p:sldId id="390" r:id="rId24"/>
-    <p:sldId id="367" r:id="rId25"/>
-    <p:sldId id="296" r:id="rId26"/>
-    <p:sldId id="340" r:id="rId27"/>
+    <p:sldId id="439" r:id="rId13"/>
+    <p:sldId id="438" r:id="rId14"/>
+    <p:sldId id="441" r:id="rId15"/>
+    <p:sldId id="401" r:id="rId16"/>
+    <p:sldId id="424" r:id="rId17"/>
+    <p:sldId id="440" r:id="rId18"/>
+    <p:sldId id="391" r:id="rId19"/>
+    <p:sldId id="426" r:id="rId20"/>
+    <p:sldId id="433" r:id="rId21"/>
+    <p:sldId id="427" r:id="rId22"/>
+    <p:sldId id="428" r:id="rId23"/>
+    <p:sldId id="430" r:id="rId24"/>
+    <p:sldId id="390" r:id="rId25"/>
+    <p:sldId id="367" r:id="rId26"/>
+    <p:sldId id="296" r:id="rId27"/>
+    <p:sldId id="340" r:id="rId28"/>
   </p:sldIdLst>
   <p:sldSz cx="12192000" cy="6858000"/>
   <p:notesSz cx="6858000" cy="9144000"/>
@@ -7260,7 +7261,24 @@
           <a:bodyPr/>
           <a:lstStyle/>
           <a:p>
-            <a:endParaRPr lang="en-US" dirty="0"/>
+            <a:pPr marL="0" marR="0" lvl="0" indent="0" algn="l" defTabSz="914400" rtl="0" eaLnBrk="1" fontAlgn="auto" latinLnBrk="0" hangingPunct="1">
+              <a:lnSpc>
+                <a:spcPct val="100000"/>
+              </a:lnSpc>
+              <a:spcBef>
+                <a:spcPts val="0"/>
+              </a:spcBef>
+              <a:spcAft>
+                <a:spcPts val="0"/>
+              </a:spcAft>
+              <a:buClrTx/>
+              <a:buSzTx/>
+              <a:buFontTx/>
+              <a:buNone/>
+              <a:tabLst/>
+              <a:defRPr/>
+            </a:pPr>
+            <a:endParaRPr lang="en-US" baseline="0" dirty="0"/>
           </a:p>
         </p:txBody>
       </p:sp>
@@ -7279,7 +7297,7 @@
           <a:bodyPr/>
           <a:lstStyle/>
           <a:p>
-            <a:fld id="{372B4D55-8C27-4C2C-B1CD-E79AEC43B316}" type="slidenum">
+            <a:fld id="{795E7D87-CD48-43C8-A7EA-8D4BB480ED50}" type="slidenum">
               <a:rPr lang="en-US" smtClean="0"/>
               <a:t>14</a:t>
             </a:fld>
@@ -7290,7 +7308,7 @@
     </p:spTree>
     <p:extLst>
       <p:ext uri="{BB962C8B-B14F-4D97-AF65-F5344CB8AC3E}">
-        <p14:creationId xmlns:p14="http://schemas.microsoft.com/office/powerpoint/2010/main" val="3988755010"/>
+        <p14:creationId xmlns:p14="http://schemas.microsoft.com/office/powerpoint/2010/main" val="3354213934"/>
       </p:ext>
     </p:extLst>
   </p:cSld>
@@ -7344,112 +7362,7 @@
           <a:bodyPr/>
           <a:lstStyle/>
           <a:p>
-            <a:r>
-              <a:rPr lang="en-US" dirty="0"/>
-              <a:t>The entire ecosystem</a:t>
-            </a:r>
-            <a:r>
-              <a:rPr lang="en-US" baseline="0" dirty="0"/>
-              <a:t> can be represented by these six columns.  The EMR and other collection databases sit in the 1</a:t>
-            </a:r>
-            <a:r>
-              <a:rPr lang="en-US" baseline="30000" dirty="0"/>
-              <a:t>st</a:t>
-            </a:r>
-            <a:r>
-              <a:rPr lang="en-US" baseline="0" dirty="0"/>
-              <a:t> column and feed the warehouse in the third.  This movement is automated.  Inside the warehouse, the info from the different  sources are staged &amp; combined.  Different patients can be placed in the same table.  Perhaps more importantly, records for a single patient that are scattered across different sources are linked.  </a:t>
-            </a:r>
-          </a:p>
-          <a:p>
-            <a:pPr marL="0" marR="0" lvl="0" indent="0" algn="l" defTabSz="914400" rtl="0" eaLnBrk="1" fontAlgn="auto" latinLnBrk="0" hangingPunct="1">
-              <a:lnSpc>
-                <a:spcPct val="100000"/>
-              </a:lnSpc>
-              <a:spcBef>
-                <a:spcPts val="0"/>
-              </a:spcBef>
-              <a:spcAft>
-                <a:spcPts val="0"/>
-              </a:spcAft>
-              <a:buClrTx/>
-              <a:buSzTx/>
-              <a:buFontTx/>
-              <a:buNone/>
-              <a:tabLst/>
-              <a:defRPr/>
-            </a:pPr>
-            <a:r>
-              <a:rPr lang="en-US" baseline="0" dirty="0"/>
-              <a:t>When a investigation is approved by the IRB, we can develop a tiny database in </a:t>
-            </a:r>
-            <a:r>
-              <a:rPr lang="en-US" baseline="0" dirty="0" err="1"/>
-              <a:t>REDCap</a:t>
-            </a:r>
-            <a:r>
-              <a:rPr lang="en-US" baseline="0" dirty="0"/>
-              <a:t> that contains the dataset needed for their analysis (5</a:t>
-            </a:r>
-            <a:r>
-              <a:rPr lang="en-US" baseline="30000" dirty="0"/>
-              <a:t>th</a:t>
-            </a:r>
-            <a:r>
-              <a:rPr lang="en-US" baseline="0" dirty="0"/>
-              <a:t> column).  There are a few reasons why </a:t>
-            </a:r>
-            <a:r>
-              <a:rPr lang="en-US" baseline="0" dirty="0" err="1"/>
-              <a:t>REDCap</a:t>
-            </a:r>
-            <a:r>
-              <a:rPr lang="en-US" baseline="0" dirty="0"/>
-              <a:t> is preferred.  First, it’s more secure and scalable than distributing loose Excel files repeatedly for the same project.  Second, REDCap has a lot of momentum and adoption, so it’s become familiar to a lot of people on campus  --like those using it to collect research data.</a:t>
-            </a:r>
-          </a:p>
-          <a:p>
-            <a:pPr marL="0" marR="0" lvl="0" indent="0" algn="l" defTabSz="914400" rtl="0" eaLnBrk="1" fontAlgn="auto" latinLnBrk="0" hangingPunct="1">
-              <a:lnSpc>
-                <a:spcPct val="100000"/>
-              </a:lnSpc>
-              <a:spcBef>
-                <a:spcPts val="0"/>
-              </a:spcBef>
-              <a:spcAft>
-                <a:spcPts val="0"/>
-              </a:spcAft>
-              <a:buClrTx/>
-              <a:buSzTx/>
-              <a:buFontTx/>
-              <a:buNone/>
-              <a:tabLst/>
-              <a:defRPr/>
-            </a:pPr>
-            <a:endParaRPr lang="en-US" baseline="0" dirty="0"/>
-          </a:p>
-          <a:p>
-            <a:pPr marL="0" marR="0" lvl="0" indent="0" algn="l" defTabSz="914400" rtl="0" eaLnBrk="1" fontAlgn="auto" latinLnBrk="0" hangingPunct="1">
-              <a:lnSpc>
-                <a:spcPct val="100000"/>
-              </a:lnSpc>
-              <a:spcBef>
-                <a:spcPts val="0"/>
-              </a:spcBef>
-              <a:spcAft>
-                <a:spcPts val="0"/>
-              </a:spcAft>
-              <a:buClrTx/>
-              <a:buSzTx/>
-              <a:buFontTx/>
-              <a:buNone/>
-              <a:tabLst/>
-              <a:defRPr/>
-            </a:pPr>
-            <a:r>
-              <a:rPr lang="en-US" baseline="0" dirty="0"/>
-              <a:t>We’ve always emphasized that we developed this to be as modular as possible.  If someone could benefit from a few columns, they don’t have to commit to the whole thing. This modular approach has paid off, and I’ll return to that in the last few slides.</a:t>
-            </a:r>
+            <a:endParaRPr lang="en-US" dirty="0"/>
           </a:p>
         </p:txBody>
       </p:sp>
@@ -7468,9 +7381,9 @@
           <a:bodyPr/>
           <a:lstStyle/>
           <a:p>
-            <a:fld id="{9ED73DBF-282D-4756-9D64-E939A17BC891}" type="slidenum">
+            <a:fld id="{372B4D55-8C27-4C2C-B1CD-E79AEC43B316}" type="slidenum">
               <a:rPr lang="en-US" smtClean="0"/>
-              <a:t>18</a:t>
+              <a:t>15</a:t>
             </a:fld>
             <a:endParaRPr lang="en-US"/>
           </a:p>
@@ -7479,7 +7392,7 @@
     </p:spTree>
     <p:extLst>
       <p:ext uri="{BB962C8B-B14F-4D97-AF65-F5344CB8AC3E}">
-        <p14:creationId xmlns:p14="http://schemas.microsoft.com/office/powerpoint/2010/main" val="3277291029"/>
+        <p14:creationId xmlns:p14="http://schemas.microsoft.com/office/powerpoint/2010/main" val="3988755010"/>
       </p:ext>
     </p:extLst>
   </p:cSld>
@@ -7533,6 +7446,24 @@
           <a:bodyPr/>
           <a:lstStyle/>
           <a:p>
+            <a:r>
+              <a:rPr lang="en-US" dirty="0"/>
+              <a:t>The entire ecosystem</a:t>
+            </a:r>
+            <a:r>
+              <a:rPr lang="en-US" baseline="0" dirty="0"/>
+              <a:t> can be represented by these six columns.  The EMR and other collection databases sit in the 1</a:t>
+            </a:r>
+            <a:r>
+              <a:rPr lang="en-US" baseline="30000" dirty="0"/>
+              <a:t>st</a:t>
+            </a:r>
+            <a:r>
+              <a:rPr lang="en-US" baseline="0" dirty="0"/>
+              <a:t> column and feed the warehouse in the third.  This movement is automated.  Inside the warehouse, the info from the different  sources are staged &amp; combined.  Different patients can be placed in the same table.  Perhaps more importantly, records for a single patient that are scattered across different sources are linked.  </a:t>
+            </a:r>
+          </a:p>
+          <a:p>
             <a:pPr marL="0" marR="0" lvl="0" indent="0" algn="l" defTabSz="914400" rtl="0" eaLnBrk="1" fontAlgn="auto" latinLnBrk="0" hangingPunct="1">
               <a:lnSpc>
                 <a:spcPct val="100000"/>
@@ -7552,39 +7483,74 @@
             </a:pPr>
             <a:r>
               <a:rPr lang="en-US" baseline="0" dirty="0"/>
-              <a:t>Here are the data sources for the research projects that we’ve assisted with.  Roughly in descending order of frequency. </a:t>
-            </a:r>
-            <a:endParaRPr lang="en-US" dirty="0"/>
-          </a:p>
-          <a:p>
-            <a:r>
-              <a:rPr lang="en-US" dirty="0"/>
-              <a:t>Most of our projects</a:t>
+              <a:t>When a investigation is approved by the IRB, we can develop a tiny database in </a:t>
+            </a:r>
+            <a:r>
+              <a:rPr lang="en-US" baseline="0" dirty="0" err="1"/>
+              <a:t>REDCap</a:t>
             </a:r>
             <a:r>
               <a:rPr lang="en-US" baseline="0" dirty="0"/>
-              <a:t> involve inpatient EMRs, outpatient EMRs, and billing systems</a:t>
-            </a:r>
-            <a:r>
-              <a:rPr lang="en-US" dirty="0"/>
-              <a:t>.</a:t>
-            </a:r>
-          </a:p>
-          <a:p>
+              <a:t> that contains the dataset needed for their analysis (5</a:t>
+            </a:r>
+            <a:r>
+              <a:rPr lang="en-US" baseline="30000" dirty="0"/>
+              <a:t>th</a:t>
+            </a:r>
+            <a:r>
+              <a:rPr lang="en-US" baseline="0" dirty="0"/>
+              <a:t> column).  There are a few reasons why </a:t>
+            </a:r>
+            <a:r>
+              <a:rPr lang="en-US" baseline="0" dirty="0" err="1"/>
+              <a:t>REDCap</a:t>
+            </a:r>
+            <a:r>
+              <a:rPr lang="en-US" baseline="0" dirty="0"/>
+              <a:t> is preferred.  First, it’s more secure and scalable than distributing loose Excel files repeatedly for the same project.  Second, REDCap has a lot of momentum and adoption, so it’s become familiar to a lot of people on campus  --like those using it to collect research data.</a:t>
+            </a:r>
+          </a:p>
+          <a:p>
+            <a:pPr marL="0" marR="0" lvl="0" indent="0" algn="l" defTabSz="914400" rtl="0" eaLnBrk="1" fontAlgn="auto" latinLnBrk="0" hangingPunct="1">
+              <a:lnSpc>
+                <a:spcPct val="100000"/>
+              </a:lnSpc>
+              <a:spcBef>
+                <a:spcPts val="0"/>
+              </a:spcBef>
+              <a:spcAft>
+                <a:spcPts val="0"/>
+              </a:spcAft>
+              <a:buClrTx/>
+              <a:buSzTx/>
+              <a:buFontTx/>
+              <a:buNone/>
+              <a:tabLst/>
+              <a:defRPr/>
+            </a:pPr>
             <a:endParaRPr lang="en-US" baseline="0" dirty="0"/>
           </a:p>
           <a:p>
+            <a:pPr marL="0" marR="0" lvl="0" indent="0" algn="l" defTabSz="914400" rtl="0" eaLnBrk="1" fontAlgn="auto" latinLnBrk="0" hangingPunct="1">
+              <a:lnSpc>
+                <a:spcPct val="100000"/>
+              </a:lnSpc>
+              <a:spcBef>
+                <a:spcPts val="0"/>
+              </a:spcBef>
+              <a:spcAft>
+                <a:spcPts val="0"/>
+              </a:spcAft>
+              <a:buClrTx/>
+              <a:buSzTx/>
+              <a:buFontTx/>
+              <a:buNone/>
+              <a:tabLst/>
+              <a:defRPr/>
+            </a:pPr>
             <a:r>
               <a:rPr lang="en-US" baseline="0" dirty="0"/>
-              <a:t>In some ways, our experience started with datasets from external collaborators, such as the </a:t>
-            </a:r>
-            <a:r>
-              <a:rPr lang="en-US" baseline="0" dirty="0" err="1"/>
-              <a:t>Dept</a:t>
-            </a:r>
-            <a:r>
-              <a:rPr lang="en-US" baseline="0" dirty="0"/>
-              <a:t> of Health, and grew from there.</a:t>
+              <a:t>We’ve always emphasized that we developed this to be as modular as possible.  If someone could benefit from a few columns, they don’t have to commit to the whole thing. This modular approach has paid off, and I’ll return to that in the last few slides.</a:t>
             </a:r>
           </a:p>
         </p:txBody>
@@ -7604,9 +7570,9 @@
           <a:bodyPr/>
           <a:lstStyle/>
           <a:p>
-            <a:fld id="{795E7D87-CD48-43C8-A7EA-8D4BB480ED50}" type="slidenum">
+            <a:fld id="{9ED73DBF-282D-4756-9D64-E939A17BC891}" type="slidenum">
               <a:rPr lang="en-US" smtClean="0"/>
-              <a:t>21</a:t>
+              <a:t>19</a:t>
             </a:fld>
             <a:endParaRPr lang="en-US"/>
           </a:p>
@@ -7615,7 +7581,7 @@
     </p:spTree>
     <p:extLst>
       <p:ext uri="{BB962C8B-B14F-4D97-AF65-F5344CB8AC3E}">
-        <p14:creationId xmlns:p14="http://schemas.microsoft.com/office/powerpoint/2010/main" val="3059933623"/>
+        <p14:creationId xmlns:p14="http://schemas.microsoft.com/office/powerpoint/2010/main" val="3277291029"/>
       </p:ext>
     </p:extLst>
   </p:cSld>
@@ -7669,7 +7635,59 @@
           <a:bodyPr/>
           <a:lstStyle/>
           <a:p>
+            <a:pPr marL="0" marR="0" lvl="0" indent="0" algn="l" defTabSz="914400" rtl="0" eaLnBrk="1" fontAlgn="auto" latinLnBrk="0" hangingPunct="1">
+              <a:lnSpc>
+                <a:spcPct val="100000"/>
+              </a:lnSpc>
+              <a:spcBef>
+                <a:spcPts val="0"/>
+              </a:spcBef>
+              <a:spcAft>
+                <a:spcPts val="0"/>
+              </a:spcAft>
+              <a:buClrTx/>
+              <a:buSzTx/>
+              <a:buFontTx/>
+              <a:buNone/>
+              <a:tabLst/>
+              <a:defRPr/>
+            </a:pPr>
+            <a:r>
+              <a:rPr lang="en-US" baseline="0" dirty="0"/>
+              <a:t>Here are the data sources for the research projects that we’ve assisted with.  Roughly in descending order of frequency. </a:t>
+            </a:r>
             <a:endParaRPr lang="en-US" dirty="0"/>
+          </a:p>
+          <a:p>
+            <a:r>
+              <a:rPr lang="en-US" dirty="0"/>
+              <a:t>Most of our projects</a:t>
+            </a:r>
+            <a:r>
+              <a:rPr lang="en-US" baseline="0" dirty="0"/>
+              <a:t> involve inpatient EMRs, outpatient EMRs, and billing systems</a:t>
+            </a:r>
+            <a:r>
+              <a:rPr lang="en-US" dirty="0"/>
+              <a:t>.</a:t>
+            </a:r>
+          </a:p>
+          <a:p>
+            <a:endParaRPr lang="en-US" baseline="0" dirty="0"/>
+          </a:p>
+          <a:p>
+            <a:r>
+              <a:rPr lang="en-US" baseline="0" dirty="0"/>
+              <a:t>In some ways, our experience started with datasets from external collaborators, such as the </a:t>
+            </a:r>
+            <a:r>
+              <a:rPr lang="en-US" baseline="0" dirty="0" err="1"/>
+              <a:t>Dept</a:t>
+            </a:r>
+            <a:r>
+              <a:rPr lang="en-US" baseline="0" dirty="0"/>
+              <a:t> of Health, and grew from there.</a:t>
+            </a:r>
           </a:p>
         </p:txBody>
       </p:sp>
@@ -7688,7 +7706,7 @@
           <a:bodyPr/>
           <a:lstStyle/>
           <a:p>
-            <a:fld id="{372B4D55-8C27-4C2C-B1CD-E79AEC43B316}" type="slidenum">
+            <a:fld id="{795E7D87-CD48-43C8-A7EA-8D4BB480ED50}" type="slidenum">
               <a:rPr lang="en-US" smtClean="0"/>
               <a:t>22</a:t>
             </a:fld>
@@ -7699,7 +7717,7 @@
     </p:spTree>
     <p:extLst>
       <p:ext uri="{BB962C8B-B14F-4D97-AF65-F5344CB8AC3E}">
-        <p14:creationId xmlns:p14="http://schemas.microsoft.com/office/powerpoint/2010/main" val="2711185950"/>
+        <p14:creationId xmlns:p14="http://schemas.microsoft.com/office/powerpoint/2010/main" val="3059933623"/>
       </p:ext>
     </p:extLst>
   </p:cSld>
@@ -7772,27 +7790,18 @@
           <a:bodyPr/>
           <a:lstStyle/>
           <a:p>
-            <a:fld id="{795E7D87-CD48-43C8-A7EA-8D4BB480ED50}" type="slidenum">
-              <a:rPr lang="en-US" smtClean="0">
-                <a:solidFill>
-                  <a:prstClr val="black"/>
-                </a:solidFill>
-              </a:rPr>
-              <a:pPr/>
-              <a:t>24</a:t>
+            <a:fld id="{372B4D55-8C27-4C2C-B1CD-E79AEC43B316}" type="slidenum">
+              <a:rPr lang="en-US" smtClean="0"/>
+              <a:t>23</a:t>
             </a:fld>
-            <a:endParaRPr lang="en-US">
-              <a:solidFill>
-                <a:prstClr val="black"/>
-              </a:solidFill>
-            </a:endParaRPr>
+            <a:endParaRPr lang="en-US"/>
           </a:p>
         </p:txBody>
       </p:sp>
     </p:spTree>
     <p:extLst>
       <p:ext uri="{BB962C8B-B14F-4D97-AF65-F5344CB8AC3E}">
-        <p14:creationId xmlns:p14="http://schemas.microsoft.com/office/powerpoint/2010/main" val="3342317537"/>
+        <p14:creationId xmlns:p14="http://schemas.microsoft.com/office/powerpoint/2010/main" val="2711185950"/>
       </p:ext>
     </p:extLst>
   </p:cSld>
@@ -7846,23 +7855,6 @@
           <a:bodyPr/>
           <a:lstStyle/>
           <a:p>
-            <a:r>
-              <a:rPr lang="en-US" dirty="0"/>
-              <a:t>In short, we work closely with the oversight boards to</a:t>
-            </a:r>
-            <a:r>
-              <a:rPr lang="en-US" baseline="0" dirty="0"/>
-              <a:t> maintain compliance &amp; improve efficiency.  A new governance board is being created that’s co-chair by the informatics heads of the hospital and of the clinics.  I’m excited that this will speed up parts of our process for those studies that don’t require an IRB.</a:t>
-            </a:r>
-          </a:p>
-          <a:p>
-            <a:endParaRPr lang="en-US" baseline="0" dirty="0"/>
-          </a:p>
-          <a:p>
-            <a:r>
-              <a:rPr lang="en-US" baseline="0" dirty="0"/>
-              <a:t>[8 min cumulative]</a:t>
-            </a:r>
             <a:endParaRPr lang="en-US" dirty="0"/>
           </a:p>
         </p:txBody>
@@ -7882,9 +7874,119 @@
           <a:bodyPr/>
           <a:lstStyle/>
           <a:p>
+            <a:fld id="{795E7D87-CD48-43C8-A7EA-8D4BB480ED50}" type="slidenum">
+              <a:rPr lang="en-US" smtClean="0">
+                <a:solidFill>
+                  <a:prstClr val="black"/>
+                </a:solidFill>
+              </a:rPr>
+              <a:pPr/>
+              <a:t>25</a:t>
+            </a:fld>
+            <a:endParaRPr lang="en-US">
+              <a:solidFill>
+                <a:prstClr val="black"/>
+              </a:solidFill>
+            </a:endParaRPr>
+          </a:p>
+        </p:txBody>
+      </p:sp>
+    </p:spTree>
+    <p:extLst>
+      <p:ext uri="{BB962C8B-B14F-4D97-AF65-F5344CB8AC3E}">
+        <p14:creationId xmlns:p14="http://schemas.microsoft.com/office/powerpoint/2010/main" val="3342317537"/>
+      </p:ext>
+    </p:extLst>
+  </p:cSld>
+  <p:clrMapOvr>
+    <a:masterClrMapping/>
+  </p:clrMapOvr>
+</p:notes>
+</file>
+
+<file path=ppt/notesSlides/notesSlide16.xml><?xml version="1.0" encoding="utf-8"?>
+<p:notes xmlns:a="http://schemas.openxmlformats.org/drawingml/2006/main" xmlns:r="http://schemas.openxmlformats.org/officeDocument/2006/relationships" xmlns:p="http://schemas.openxmlformats.org/presentationml/2006/main">
+  <p:cSld>
+    <p:spTree>
+      <p:nvGrpSpPr>
+        <p:cNvPr id="1" name=""/>
+        <p:cNvGrpSpPr/>
+        <p:nvPr/>
+      </p:nvGrpSpPr>
+      <p:grpSpPr>
+        <a:xfrm>
+          <a:off x="0" y="0"/>
+          <a:ext cx="0" cy="0"/>
+          <a:chOff x="0" y="0"/>
+          <a:chExt cx="0" cy="0"/>
+        </a:xfrm>
+      </p:grpSpPr>
+      <p:sp>
+        <p:nvSpPr>
+          <p:cNvPr id="2" name="Slide Image Placeholder 1"/>
+          <p:cNvSpPr>
+            <a:spLocks noGrp="1" noRot="1" noChangeAspect="1"/>
+          </p:cNvSpPr>
+          <p:nvPr>
+            <p:ph type="sldImg"/>
+          </p:nvPr>
+        </p:nvSpPr>
+        <p:spPr/>
+      </p:sp>
+      <p:sp>
+        <p:nvSpPr>
+          <p:cNvPr id="3" name="Notes Placeholder 2"/>
+          <p:cNvSpPr>
+            <a:spLocks noGrp="1"/>
+          </p:cNvSpPr>
+          <p:nvPr>
+            <p:ph type="body" idx="1"/>
+          </p:nvPr>
+        </p:nvSpPr>
+        <p:spPr/>
+        <p:txBody>
+          <a:bodyPr/>
+          <a:lstStyle/>
+          <a:p>
+            <a:r>
+              <a:rPr lang="en-US" dirty="0"/>
+              <a:t>In short, we work closely with the oversight boards to</a:t>
+            </a:r>
+            <a:r>
+              <a:rPr lang="en-US" baseline="0" dirty="0"/>
+              <a:t> maintain compliance &amp; improve efficiency.  A new governance board is being created that’s co-chair by the informatics heads of the hospital and of the clinics.  I’m excited that this will speed up parts of our process for those studies that don’t require an IRB.</a:t>
+            </a:r>
+          </a:p>
+          <a:p>
+            <a:endParaRPr lang="en-US" baseline="0" dirty="0"/>
+          </a:p>
+          <a:p>
+            <a:r>
+              <a:rPr lang="en-US" baseline="0" dirty="0"/>
+              <a:t>[8 min cumulative]</a:t>
+            </a:r>
+            <a:endParaRPr lang="en-US" dirty="0"/>
+          </a:p>
+        </p:txBody>
+      </p:sp>
+      <p:sp>
+        <p:nvSpPr>
+          <p:cNvPr id="4" name="Slide Number Placeholder 3"/>
+          <p:cNvSpPr>
+            <a:spLocks noGrp="1"/>
+          </p:cNvSpPr>
+          <p:nvPr>
+            <p:ph type="sldNum" sz="quarter" idx="10"/>
+          </p:nvPr>
+        </p:nvSpPr>
+        <p:spPr/>
+        <p:txBody>
+          <a:bodyPr/>
+          <a:lstStyle/>
+          <a:p>
             <a:fld id="{372B4D55-8C27-4C2C-B1CD-E79AEC43B316}" type="slidenum">
               <a:rPr lang="en-US" smtClean="0"/>
-              <a:t>26</a:t>
+              <a:t>27</a:t>
             </a:fld>
             <a:endParaRPr lang="en-US"/>
           </a:p>
@@ -8779,7 +8881,7 @@
     </p:spTree>
     <p:extLst>
       <p:ext uri="{BB962C8B-B14F-4D97-AF65-F5344CB8AC3E}">
-        <p14:creationId xmlns:p14="http://schemas.microsoft.com/office/powerpoint/2010/main" val="2302146041"/>
+        <p14:creationId xmlns:p14="http://schemas.microsoft.com/office/powerpoint/2010/main" val="2167329322"/>
       </p:ext>
     </p:extLst>
   </p:cSld>
@@ -8880,7 +8982,7 @@
     </p:spTree>
     <p:extLst>
       <p:ext uri="{BB962C8B-B14F-4D97-AF65-F5344CB8AC3E}">
-        <p14:creationId xmlns:p14="http://schemas.microsoft.com/office/powerpoint/2010/main" val="2167329322"/>
+        <p14:creationId xmlns:p14="http://schemas.microsoft.com/office/powerpoint/2010/main" val="2302146041"/>
       </p:ext>
     </p:extLst>
   </p:cSld>
@@ -18396,7 +18498,7 @@
                   <a:srgbClr val="0070C0"/>
                 </a:solidFill>
               </a:rPr>
-              <a:t>Establish Thresholds for Governance Review</a:t>
+              <a:t>Development of CRDW Policies &amp; Procedures</a:t>
             </a:r>
           </a:p>
         </p:txBody>
@@ -18413,240 +18515,106 @@
         </p:nvSpPr>
         <p:spPr>
           <a:xfrm>
-            <a:off x="128187" y="989350"/>
-            <a:ext cx="11998295" cy="5761969"/>
+            <a:off x="228600" y="929390"/>
+            <a:ext cx="11757660" cy="5821930"/>
           </a:xfrm>
         </p:spPr>
         <p:txBody>
           <a:bodyPr>
-            <a:normAutofit fontScale="92500" lnSpcReduction="20000"/>
+            <a:normAutofit/>
           </a:bodyPr>
           <a:lstStyle/>
           <a:p>
-            <a:pPr marL="0" indent="0">
-              <a:buNone/>
-            </a:pPr>
-            <a:r>
-              <a:rPr lang="en-US" dirty="0" smtClean="0"/>
-              <a:t>All </a:t>
-            </a:r>
-            <a:r>
-              <a:rPr lang="en-US" dirty="0"/>
-              <a:t>CRDW requests must be submitted to the IRB, but some may warrant additional review by this board. Our proposed thresholds are</a:t>
-            </a:r>
-            <a:r>
-              <a:rPr lang="en-US" dirty="0" smtClean="0"/>
-              <a:t>:</a:t>
-            </a:r>
-          </a:p>
-          <a:p>
-            <a:pPr marL="0" indent="0">
-              <a:buNone/>
-            </a:pPr>
             <a:endParaRPr lang="en-US" dirty="0"/>
           </a:p>
           <a:p>
-            <a:pPr marL="514350" indent="-514350">
-              <a:buFont typeface="+mj-lt"/>
-              <a:buAutoNum type="arabicPeriod"/>
-            </a:pPr>
-            <a:r>
-              <a:rPr lang="en-US" dirty="0"/>
-              <a:t>Count of included patients </a:t>
-            </a:r>
-            <a:r>
-              <a:rPr lang="en-US" dirty="0" smtClean="0"/>
-              <a:t>exceeds </a:t>
-            </a:r>
-            <a:r>
-              <a:rPr lang="en-US" dirty="0"/>
-              <a:t>10,000, </a:t>
-            </a:r>
-            <a:r>
-              <a:rPr lang="en-US" dirty="0" smtClean="0"/>
-              <a:t>or</a:t>
-            </a:r>
-          </a:p>
-          <a:p>
-            <a:pPr marL="514350" indent="-514350">
-              <a:buFont typeface="+mj-lt"/>
-              <a:buAutoNum type="arabicPeriod"/>
-            </a:pPr>
-            <a:r>
-              <a:rPr lang="en-US" sz="2800" dirty="0" smtClean="0"/>
-              <a:t>PI requests a </a:t>
-            </a:r>
-            <a:r>
-              <a:rPr lang="en-US" sz="2800" dirty="0"/>
-              <a:t>new method for delivery of PHI </a:t>
-            </a:r>
-            <a:r>
-              <a:rPr lang="en-US" sz="2800" dirty="0" smtClean="0"/>
-              <a:t/>
-            </a:r>
-            <a:br>
-              <a:rPr lang="en-US" sz="2800" dirty="0" smtClean="0"/>
-            </a:br>
-            <a:r>
-              <a:rPr lang="en-US" sz="2800" dirty="0" smtClean="0"/>
-              <a:t>(</a:t>
-            </a:r>
-            <a:r>
-              <a:rPr lang="en-US" sz="2800" i="1" dirty="0"/>
-              <a:t>e.g.</a:t>
-            </a:r>
-            <a:r>
-              <a:rPr lang="en-US" sz="2800" dirty="0"/>
-              <a:t>, automated exports to a new OSDH FTP server), </a:t>
-            </a:r>
-            <a:r>
-              <a:rPr lang="en-US" sz="2800" dirty="0" smtClean="0"/>
-              <a:t>or</a:t>
-            </a:r>
-          </a:p>
-          <a:p>
-            <a:pPr marL="514350" indent="-514350">
-              <a:buFont typeface="+mj-lt"/>
-              <a:buAutoNum type="arabicPeriod"/>
-            </a:pPr>
-            <a:r>
-              <a:rPr lang="en-US" sz="2800" dirty="0" smtClean="0"/>
-              <a:t>Recipients </a:t>
-            </a:r>
-            <a:r>
-              <a:rPr lang="en-US" sz="2800" dirty="0"/>
-              <a:t>of PHI are external to OUHSC, </a:t>
-            </a:r>
-            <a:r>
-              <a:rPr lang="en-US" sz="2800" dirty="0" smtClean="0"/>
-              <a:t>or</a:t>
-            </a:r>
-          </a:p>
-          <a:p>
-            <a:pPr marL="514350" indent="-514350">
-              <a:buFont typeface="+mj-lt"/>
-              <a:buAutoNum type="arabicPeriod"/>
-            </a:pPr>
-            <a:r>
-              <a:rPr lang="en-US" sz="2800" dirty="0" smtClean="0"/>
-              <a:t>CRDW </a:t>
-            </a:r>
-            <a:r>
-              <a:rPr lang="en-US" sz="2800" dirty="0"/>
-              <a:t>team has concerns about broad language in the protocol </a:t>
-            </a:r>
-            <a:r>
-              <a:rPr lang="en-US" sz="2800" dirty="0" smtClean="0"/>
-              <a:t>or </a:t>
-            </a:r>
-            <a:r>
-              <a:rPr lang="en-US" sz="2800" dirty="0"/>
-              <a:t>study application (</a:t>
-            </a:r>
-            <a:r>
-              <a:rPr lang="en-US" sz="2800" i="1" dirty="0"/>
-              <a:t>e.g.</a:t>
-            </a:r>
-            <a:r>
-              <a:rPr lang="en-US" sz="2800" dirty="0"/>
-              <a:t>, “relevant medical history”, “clinical documentation”, “outcomes”), </a:t>
-            </a:r>
-            <a:r>
-              <a:rPr lang="en-US" sz="2800" dirty="0" smtClean="0"/>
-              <a:t>or</a:t>
-            </a:r>
-          </a:p>
-          <a:p>
-            <a:pPr marL="514350" indent="-514350">
-              <a:buFont typeface="+mj-lt"/>
-              <a:buAutoNum type="arabicPeriod"/>
-            </a:pPr>
-            <a:r>
-              <a:rPr lang="en-US" sz="2800" smtClean="0"/>
-              <a:t>Extracted CRDW </a:t>
-            </a:r>
-            <a:r>
-              <a:rPr lang="en-US" sz="2800" dirty="0" smtClean="0"/>
-              <a:t>dataset contributes to a Registry (</a:t>
-            </a:r>
-            <a:r>
-              <a:rPr lang="en-US" sz="2800" dirty="0"/>
-              <a:t>internal </a:t>
-            </a:r>
-            <a:r>
-              <a:rPr lang="en-US" sz="2800" dirty="0" smtClean="0"/>
-              <a:t>or </a:t>
-            </a:r>
-            <a:r>
-              <a:rPr lang="en-US" sz="2800" smtClean="0"/>
-              <a:t>multi-site).</a:t>
-            </a:r>
-            <a:endParaRPr lang="en-US" sz="2800" dirty="0" smtClean="0"/>
-          </a:p>
-          <a:p>
-            <a:pPr marL="514350" indent="-514350">
-              <a:buFont typeface="+mj-lt"/>
-              <a:buAutoNum type="arabicPeriod"/>
-            </a:pPr>
-            <a:r>
-              <a:rPr lang="en-US" sz="2800" dirty="0" smtClean="0">
-                <a:solidFill>
-                  <a:srgbClr val="0070C0"/>
-                </a:solidFill>
-              </a:rPr>
-              <a:t>Does this board want to review sensitive &amp; confidential fields beyond IRB’s?</a:t>
-            </a:r>
-          </a:p>
-          <a:p>
-            <a:pPr marL="0" lvl="1" indent="0">
-              <a:spcBef>
-                <a:spcPts val="1000"/>
-              </a:spcBef>
-              <a:buNone/>
-            </a:pPr>
-            <a:endParaRPr lang="en-US" sz="2800" dirty="0" smtClean="0">
-              <a:solidFill>
-                <a:srgbClr val="0070C0"/>
-              </a:solidFill>
-            </a:endParaRPr>
-          </a:p>
-          <a:p>
-            <a:pPr marL="0" lvl="1" indent="0">
-              <a:spcBef>
-                <a:spcPts val="1000"/>
-              </a:spcBef>
-              <a:buNone/>
-            </a:pPr>
-            <a:r>
-              <a:rPr lang="en-US" sz="2800" dirty="0" smtClean="0"/>
-              <a:t>If so, how can organize these additional reviews to avoid delays post-IRB approval?</a:t>
-            </a:r>
-          </a:p>
-          <a:p>
-            <a:pPr marL="457200" lvl="1" indent="-457200">
+            <a:pPr marL="228600" lvl="1">
               <a:spcBef>
                 <a:spcPts val="1000"/>
               </a:spcBef>
             </a:pPr>
             <a:r>
-              <a:rPr lang="en-US" sz="2800" dirty="0" smtClean="0"/>
-              <a:t>For example, a checkbox in </a:t>
-            </a:r>
-            <a:r>
-              <a:rPr lang="en-US" sz="2800" dirty="0" err="1" smtClean="0"/>
-              <a:t>iRIS</a:t>
-            </a:r>
-            <a:r>
-              <a:rPr lang="en-US" sz="2800" dirty="0" smtClean="0"/>
-              <a:t> for each threshold triggers the review submission</a:t>
-            </a:r>
+              <a:rPr lang="en-US" sz="2800" dirty="0"/>
+              <a:t>Tier 0 (no approval required)</a:t>
+            </a:r>
+          </a:p>
+          <a:p>
+            <a:pPr marL="685800" lvl="2">
+              <a:spcBef>
+                <a:spcPts val="1000"/>
+              </a:spcBef>
+            </a:pPr>
+            <a:r>
+              <a:rPr lang="en-US" sz="2400" dirty="0"/>
+              <a:t>Feasibility assessment: these are typically last minute requests on the tail end of a grant proposal. Common masking guidelines are followed, such as all cell sizes are 20+.</a:t>
+            </a:r>
+          </a:p>
+          <a:p>
+            <a:pPr marL="228600" lvl="1">
+              <a:spcBef>
+                <a:spcPts val="1000"/>
+              </a:spcBef>
+            </a:pPr>
+            <a:r>
+              <a:rPr lang="en-US" sz="2800" dirty="0"/>
+              <a:t>Tier 1 (IRB approved conventional research)	</a:t>
+            </a:r>
+          </a:p>
+          <a:p>
+            <a:pPr marL="228600" lvl="1">
+              <a:spcBef>
+                <a:spcPts val="1000"/>
+              </a:spcBef>
+            </a:pPr>
+            <a:r>
+              <a:rPr lang="en-US" sz="2800" dirty="0"/>
+              <a:t>Tier 2 (IRB and Governance Board approved)</a:t>
+            </a:r>
+          </a:p>
+          <a:p>
+            <a:pPr marL="228600" lvl="1">
+              <a:spcBef>
+                <a:spcPts val="1000"/>
+              </a:spcBef>
+            </a:pPr>
+            <a:r>
+              <a:rPr lang="en-US" sz="2800" dirty="0"/>
+              <a:t>Tier 3 (TBD)</a:t>
+            </a:r>
+          </a:p>
+          <a:p>
+            <a:pPr marL="685800" lvl="2">
+              <a:spcBef>
+                <a:spcPts val="1000"/>
+              </a:spcBef>
+            </a:pPr>
+            <a:r>
+              <a:rPr lang="en-US" sz="2400" dirty="0"/>
+              <a:t>The CRDW is infrequently contracted to provide operational support, such as transforming immunization records in preparation for Epic implementation.</a:t>
+            </a:r>
+          </a:p>
+          <a:p>
+            <a:pPr marL="228600" lvl="1">
+              <a:spcBef>
+                <a:spcPts val="1000"/>
+              </a:spcBef>
+            </a:pPr>
+            <a:endParaRPr lang="en-US" sz="2800" dirty="0"/>
+          </a:p>
+          <a:p>
+            <a:pPr marL="228600" lvl="1">
+              <a:spcBef>
+                <a:spcPts val="1000"/>
+              </a:spcBef>
+            </a:pPr>
+            <a:endParaRPr lang="en-US" sz="2800" dirty="0"/>
           </a:p>
         </p:txBody>
       </p:sp>
     </p:spTree>
     <p:extLst>
       <p:ext uri="{BB962C8B-B14F-4D97-AF65-F5344CB8AC3E}">
-        <p14:creationId xmlns:p14="http://schemas.microsoft.com/office/powerpoint/2010/main" val="2119398853"/>
+        <p14:creationId xmlns:p14="http://schemas.microsoft.com/office/powerpoint/2010/main" val="3617170120"/>
       </p:ext>
     </p:extLst>
   </p:cSld>
@@ -18685,8 +18653,8 @@
         </p:nvSpPr>
         <p:spPr>
           <a:xfrm>
-            <a:off x="838200" y="0"/>
-            <a:ext cx="10515600" cy="1199213"/>
+            <a:off x="128187" y="0"/>
+            <a:ext cx="11998295" cy="1199213"/>
           </a:xfrm>
         </p:spPr>
         <p:txBody>
@@ -18702,7 +18670,23 @@
                   <a:srgbClr val="0070C0"/>
                 </a:solidFill>
               </a:rPr>
-              <a:t>Development of CRDW Policies &amp; Procedures</a:t>
+              <a:t>Establish Thresholds for </a:t>
+            </a:r>
+            <a:r>
+              <a:rPr lang="en-US" b="1" i="1" dirty="0" smtClean="0">
+                <a:solidFill>
+                  <a:srgbClr val="0070C0"/>
+                </a:solidFill>
+              </a:rPr>
+              <a:t>Tier 2 Governance </a:t>
+            </a:r>
+            <a:r>
+              <a:rPr lang="en-US" b="1" i="1" dirty="0">
+                <a:solidFill>
+                  <a:srgbClr val="0070C0"/>
+                </a:solidFill>
+              </a:rPr>
+              <a:t>Review</a:t>
             </a:r>
           </a:p>
         </p:txBody>
@@ -18719,106 +18703,239 @@
         </p:nvSpPr>
         <p:spPr>
           <a:xfrm>
-            <a:off x="228600" y="929390"/>
-            <a:ext cx="11757660" cy="5821930"/>
+            <a:off x="128187" y="1199213"/>
+            <a:ext cx="11998295" cy="5552106"/>
           </a:xfrm>
         </p:spPr>
         <p:txBody>
           <a:bodyPr>
-            <a:normAutofit/>
+            <a:normAutofit fontScale="92500" lnSpcReduction="20000"/>
           </a:bodyPr>
           <a:lstStyle/>
           <a:p>
+            <a:pPr marL="0" indent="0">
+              <a:buNone/>
+            </a:pPr>
+            <a:r>
+              <a:rPr lang="en-US" dirty="0" smtClean="0"/>
+              <a:t>All </a:t>
+            </a:r>
+            <a:r>
+              <a:rPr lang="en-US" dirty="0"/>
+              <a:t>CRDW requests must be submitted to the IRB, but some may warrant additional review by this board. Our proposed thresholds are</a:t>
+            </a:r>
+            <a:r>
+              <a:rPr lang="en-US" dirty="0" smtClean="0"/>
+              <a:t>:</a:t>
+            </a:r>
+          </a:p>
+          <a:p>
+            <a:pPr marL="0" indent="0">
+              <a:buNone/>
+            </a:pPr>
             <a:endParaRPr lang="en-US" dirty="0"/>
           </a:p>
           <a:p>
-            <a:pPr marL="228600" lvl="1">
+            <a:pPr marL="514350" indent="-514350">
+              <a:buFont typeface="+mj-lt"/>
+              <a:buAutoNum type="arabicPeriod"/>
+            </a:pPr>
+            <a:r>
+              <a:rPr lang="en-US" dirty="0"/>
+              <a:t>Count of included patients </a:t>
+            </a:r>
+            <a:r>
+              <a:rPr lang="en-US" dirty="0" smtClean="0"/>
+              <a:t>exceeds </a:t>
+            </a:r>
+            <a:r>
+              <a:rPr lang="en-US" dirty="0"/>
+              <a:t>10,000, </a:t>
+            </a:r>
+            <a:r>
+              <a:rPr lang="en-US" dirty="0" smtClean="0"/>
+              <a:t>or</a:t>
+            </a:r>
+          </a:p>
+          <a:p>
+            <a:pPr marL="514350" indent="-514350">
+              <a:buFont typeface="+mj-lt"/>
+              <a:buAutoNum type="arabicPeriod"/>
+            </a:pPr>
+            <a:r>
+              <a:rPr lang="en-US" sz="2800" dirty="0" smtClean="0"/>
+              <a:t>PI requests a </a:t>
+            </a:r>
+            <a:r>
+              <a:rPr lang="en-US" sz="2800" dirty="0"/>
+              <a:t>new method for delivery of PHI </a:t>
+            </a:r>
+            <a:r>
+              <a:rPr lang="en-US" sz="2800" dirty="0" smtClean="0"/>
+              <a:t/>
+            </a:r>
+            <a:br>
+              <a:rPr lang="en-US" sz="2800" dirty="0" smtClean="0"/>
+            </a:br>
+            <a:r>
+              <a:rPr lang="en-US" sz="2800" dirty="0" smtClean="0"/>
+              <a:t>(</a:t>
+            </a:r>
+            <a:r>
+              <a:rPr lang="en-US" sz="2800" i="1" dirty="0"/>
+              <a:t>e.g.</a:t>
+            </a:r>
+            <a:r>
+              <a:rPr lang="en-US" sz="2800" dirty="0"/>
+              <a:t>, automated exports to a new OSDH FTP server), </a:t>
+            </a:r>
+            <a:r>
+              <a:rPr lang="en-US" sz="2800" dirty="0" smtClean="0"/>
+              <a:t>or</a:t>
+            </a:r>
+          </a:p>
+          <a:p>
+            <a:pPr marL="514350" indent="-514350">
+              <a:buFont typeface="+mj-lt"/>
+              <a:buAutoNum type="arabicPeriod"/>
+            </a:pPr>
+            <a:r>
+              <a:rPr lang="en-US" sz="2800" dirty="0" smtClean="0"/>
+              <a:t>Recipients </a:t>
+            </a:r>
+            <a:r>
+              <a:rPr lang="en-US" sz="2800" dirty="0"/>
+              <a:t>of PHI are external to OUHSC, </a:t>
+            </a:r>
+            <a:r>
+              <a:rPr lang="en-US" sz="2800" dirty="0" smtClean="0"/>
+              <a:t>or</a:t>
+            </a:r>
+          </a:p>
+          <a:p>
+            <a:pPr marL="514350" indent="-514350">
+              <a:buFont typeface="+mj-lt"/>
+              <a:buAutoNum type="arabicPeriod"/>
+            </a:pPr>
+            <a:r>
+              <a:rPr lang="en-US" sz="2800" dirty="0" smtClean="0"/>
+              <a:t>CRDW </a:t>
+            </a:r>
+            <a:r>
+              <a:rPr lang="en-US" sz="2800" dirty="0"/>
+              <a:t>team has concerns about broad language in the protocol </a:t>
+            </a:r>
+            <a:r>
+              <a:rPr lang="en-US" sz="2800" dirty="0" smtClean="0"/>
+              <a:t>or </a:t>
+            </a:r>
+            <a:r>
+              <a:rPr lang="en-US" sz="2800" dirty="0"/>
+              <a:t>study application (</a:t>
+            </a:r>
+            <a:r>
+              <a:rPr lang="en-US" sz="2800" i="1" dirty="0"/>
+              <a:t>e.g.</a:t>
+            </a:r>
+            <a:r>
+              <a:rPr lang="en-US" sz="2800" dirty="0"/>
+              <a:t>, “relevant medical history”, “clinical documentation”, “outcomes”), </a:t>
+            </a:r>
+            <a:r>
+              <a:rPr lang="en-US" sz="2800" dirty="0" smtClean="0"/>
+              <a:t>or</a:t>
+            </a:r>
+          </a:p>
+          <a:p>
+            <a:pPr marL="514350" indent="-514350">
+              <a:buFont typeface="+mj-lt"/>
+              <a:buAutoNum type="arabicPeriod"/>
+            </a:pPr>
+            <a:r>
+              <a:rPr lang="en-US" sz="2800" dirty="0" smtClean="0"/>
+              <a:t>Extracted CRDW dataset contributes to a </a:t>
+            </a:r>
+            <a:r>
+              <a:rPr lang="en-US" sz="2800" dirty="0" smtClean="0"/>
+              <a:t>registry </a:t>
+            </a:r>
+            <a:r>
+              <a:rPr lang="en-US" sz="2800" dirty="0" smtClean="0"/>
+              <a:t>(</a:t>
+            </a:r>
+            <a:r>
+              <a:rPr lang="en-US" sz="2800" dirty="0"/>
+              <a:t>internal </a:t>
+            </a:r>
+            <a:r>
+              <a:rPr lang="en-US" sz="2800" dirty="0" smtClean="0"/>
+              <a:t>or multi-site).</a:t>
+            </a:r>
+          </a:p>
+          <a:p>
+            <a:pPr marL="514350" indent="-514350">
+              <a:buFont typeface="+mj-lt"/>
+              <a:buAutoNum type="arabicPeriod"/>
+            </a:pPr>
+            <a:r>
+              <a:rPr lang="en-US" sz="2800" dirty="0" smtClean="0">
+                <a:solidFill>
+                  <a:srgbClr val="0070C0"/>
+                </a:solidFill>
+              </a:rPr>
+              <a:t>Does this board want to review sensitive &amp; confidential fields beyond IRB’s?</a:t>
+            </a:r>
+          </a:p>
+          <a:p>
+            <a:pPr marL="0" lvl="1" indent="0">
+              <a:spcBef>
+                <a:spcPts val="1000"/>
+              </a:spcBef>
+              <a:buNone/>
+            </a:pPr>
+            <a:endParaRPr lang="en-US" sz="2800" dirty="0" smtClean="0">
+              <a:solidFill>
+                <a:srgbClr val="0070C0"/>
+              </a:solidFill>
+            </a:endParaRPr>
+          </a:p>
+          <a:p>
+            <a:pPr marL="0" lvl="1" indent="0">
+              <a:spcBef>
+                <a:spcPts val="1000"/>
+              </a:spcBef>
+              <a:buNone/>
+            </a:pPr>
+            <a:r>
+              <a:rPr lang="en-US" sz="2800" dirty="0" smtClean="0"/>
+              <a:t>If so, how can organize these additional reviews to avoid delays post-IRB approval?</a:t>
+            </a:r>
+          </a:p>
+          <a:p>
+            <a:pPr marL="457200" lvl="1" indent="-457200">
               <a:spcBef>
                 <a:spcPts val="1000"/>
               </a:spcBef>
             </a:pPr>
             <a:r>
-              <a:rPr lang="en-US" sz="2800" dirty="0"/>
-              <a:t>Tier 0 (no approval required)</a:t>
-            </a:r>
-          </a:p>
-          <a:p>
-            <a:pPr marL="685800" lvl="2">
-              <a:spcBef>
-                <a:spcPts val="1000"/>
-              </a:spcBef>
-            </a:pPr>
-            <a:r>
-              <a:rPr lang="en-US" sz="2400" dirty="0"/>
-              <a:t>Feasibility assessment: these are typically last minute requests on the tail end of a grant proposal. Common masking guidelines are followed, such as all cell sizes are 20+.</a:t>
-            </a:r>
-          </a:p>
-          <a:p>
-            <a:pPr marL="228600" lvl="1">
-              <a:spcBef>
-                <a:spcPts val="1000"/>
-              </a:spcBef>
-            </a:pPr>
-            <a:r>
-              <a:rPr lang="en-US" sz="2800" dirty="0"/>
-              <a:t>Tier 1 (IRB approved conventional research)	</a:t>
-            </a:r>
-          </a:p>
-          <a:p>
-            <a:pPr marL="228600" lvl="1">
-              <a:spcBef>
-                <a:spcPts val="1000"/>
-              </a:spcBef>
-            </a:pPr>
-            <a:r>
-              <a:rPr lang="en-US" sz="2800" dirty="0"/>
-              <a:t>Tier 2 (IRB and Governance Board approved)</a:t>
-            </a:r>
-          </a:p>
-          <a:p>
-            <a:pPr marL="228600" lvl="1">
-              <a:spcBef>
-                <a:spcPts val="1000"/>
-              </a:spcBef>
-            </a:pPr>
-            <a:r>
-              <a:rPr lang="en-US" sz="2800" dirty="0"/>
-              <a:t>Tier 3 (TBD)</a:t>
-            </a:r>
-          </a:p>
-          <a:p>
-            <a:pPr marL="685800" lvl="2">
-              <a:spcBef>
-                <a:spcPts val="1000"/>
-              </a:spcBef>
-            </a:pPr>
-            <a:r>
-              <a:rPr lang="en-US" sz="2400" dirty="0"/>
-              <a:t>The CRDW is infrequently contracted to provide operational support, such as transforming immunization records in preparation for Epic implementation.</a:t>
-            </a:r>
-          </a:p>
-          <a:p>
-            <a:pPr marL="228600" lvl="1">
-              <a:spcBef>
-                <a:spcPts val="1000"/>
-              </a:spcBef>
-            </a:pPr>
-            <a:endParaRPr lang="en-US" sz="2800" dirty="0"/>
-          </a:p>
-          <a:p>
-            <a:pPr marL="228600" lvl="1">
-              <a:spcBef>
-                <a:spcPts val="1000"/>
-              </a:spcBef>
-            </a:pPr>
-            <a:endParaRPr lang="en-US" sz="2800" dirty="0"/>
+              <a:rPr lang="en-US" sz="2800" dirty="0" smtClean="0"/>
+              <a:t>For example, a checkbox in </a:t>
+            </a:r>
+            <a:r>
+              <a:rPr lang="en-US" sz="2800" dirty="0" err="1" smtClean="0"/>
+              <a:t>iRIS</a:t>
+            </a:r>
+            <a:r>
+              <a:rPr lang="en-US" sz="2800" dirty="0" smtClean="0"/>
+              <a:t> for each threshold triggers the review submission</a:t>
+            </a:r>
           </a:p>
         </p:txBody>
       </p:sp>
     </p:spTree>
     <p:extLst>
       <p:ext uri="{BB962C8B-B14F-4D97-AF65-F5344CB8AC3E}">
-        <p14:creationId xmlns:p14="http://schemas.microsoft.com/office/powerpoint/2010/main" val="3617170120"/>
+        <p14:creationId xmlns:p14="http://schemas.microsoft.com/office/powerpoint/2010/main" val="2119398853"/>
       </p:ext>
     </p:extLst>
   </p:cSld>
@@ -18857,8 +18974,8 @@
         </p:nvSpPr>
         <p:spPr>
           <a:xfrm>
-            <a:off x="565151" y="70785"/>
-            <a:ext cx="10515600" cy="640416"/>
+            <a:off x="838200" y="0"/>
+            <a:ext cx="10515600" cy="1199213"/>
           </a:xfrm>
         </p:spPr>
         <p:txBody>
@@ -18867,14 +18984,28 @@
           </a:bodyPr>
           <a:lstStyle/>
           <a:p>
-            <a:r>
-              <a:rPr lang="en-US" sz="3600" b="1" i="1" dirty="0">
+            <a:pPr algn="ctr"/>
+            <a:r>
+              <a:rPr lang="en-US" b="1" i="1" dirty="0" smtClean="0">
                 <a:solidFill>
                   <a:srgbClr val="0070C0"/>
                 </a:solidFill>
               </a:rPr>
-              <a:t>CRDW Requests</a:t>
-            </a:r>
+              <a:t>Contributing to </a:t>
+            </a:r>
+            <a:r>
+              <a:rPr lang="en-US" b="1" i="1" smtClean="0">
+                <a:solidFill>
+                  <a:srgbClr val="0070C0"/>
+                </a:solidFill>
+              </a:rPr>
+              <a:t>External Registries</a:t>
+            </a:r>
+            <a:endParaRPr lang="en-US" b="1" i="1" dirty="0">
+              <a:solidFill>
+                <a:srgbClr val="0070C0"/>
+              </a:solidFill>
+            </a:endParaRPr>
           </a:p>
         </p:txBody>
       </p:sp>
@@ -18890,224 +19021,114 @@
         </p:nvSpPr>
         <p:spPr>
           <a:xfrm>
-            <a:off x="565151" y="768351"/>
-            <a:ext cx="10814050" cy="5918200"/>
+            <a:off x="128187" y="989350"/>
+            <a:ext cx="11998295" cy="5761969"/>
           </a:xfrm>
         </p:spPr>
         <p:txBody>
           <a:bodyPr>
-            <a:noAutofit/>
+            <a:normAutofit/>
           </a:bodyPr>
           <a:lstStyle/>
           <a:p>
-            <a:pPr marL="457200" lvl="1" indent="-457200">
-              <a:buFont typeface="+mj-lt"/>
-              <a:buAutoNum type="arabicPeriod"/>
+            <a:pPr marL="0" indent="0">
+              <a:buNone/>
             </a:pPr>
             <a:r>
-              <a:rPr lang="en-US" sz="2200" dirty="0"/>
-              <a:t>Ideally, IRB would implement a procedure to allow for CDRW upon initial approval without adding staff to KSP (e.g., a check-box on the application indicating use of CDRW to obtain data</a:t>
-            </a:r>
-            <a:r>
-              <a:rPr lang="en-US" sz="2200" dirty="0" smtClean="0"/>
-              <a:t>).</a:t>
-            </a:r>
-            <a:endParaRPr lang="en-US" sz="2200" dirty="0"/>
-          </a:p>
-          <a:p>
-            <a:pPr marL="457200" lvl="1" indent="-457200">
-              <a:buFont typeface="+mj-lt"/>
-              <a:buAutoNum type="arabicPeriod"/>
+              <a:rPr lang="en-US" dirty="0" smtClean="0"/>
+              <a:t>Regarding </a:t>
+            </a:r>
+            <a:r>
+              <a:rPr lang="en-US" dirty="0"/>
+              <a:t>decisions around data that leave </a:t>
+            </a:r>
+            <a:r>
+              <a:rPr lang="en-US" dirty="0" smtClean="0"/>
+              <a:t>OU</a:t>
+            </a:r>
+            <a:r>
+              <a:rPr lang="en-US" dirty="0"/>
+              <a:t> </a:t>
+            </a:r>
+            <a:r>
+              <a:rPr lang="en-US" dirty="0" smtClean="0"/>
+              <a:t>…should there be policies involving</a:t>
+            </a:r>
+            <a:endParaRPr lang="en-US" dirty="0"/>
+          </a:p>
+          <a:p>
+            <a:pPr marL="0" indent="0">
+              <a:buNone/>
             </a:pPr>
-            <a:r>
-              <a:rPr lang="en-US" sz="2200" dirty="0" smtClean="0"/>
-              <a:t>Routine meetings </a:t>
-            </a:r>
-            <a:r>
-              <a:rPr lang="en-US" sz="2200" dirty="0"/>
-              <a:t>with an OUM Clinical Information Specialist / Application Analyst (someone like Megan Posada</a:t>
-            </a:r>
-            <a:r>
-              <a:rPr lang="en-US" sz="2200" dirty="0" smtClean="0"/>
-              <a:t>). </a:t>
-            </a:r>
-            <a:endParaRPr lang="en-US" sz="2200" dirty="0"/>
-          </a:p>
-          <a:p>
-            <a:pPr marL="457200" lvl="1" indent="-457200">
-              <a:buFont typeface="+mj-lt"/>
-              <a:buAutoNum type="arabicPeriod"/>
-            </a:pPr>
-            <a:r>
-              <a:rPr lang="en-US" sz="2200" dirty="0"/>
-              <a:t>We would like read-only access to the other Meditech warehouse (being developed by </a:t>
-            </a:r>
-            <a:r>
-              <a:rPr lang="en-US" sz="2200" dirty="0" err="1"/>
-              <a:t>CereCore</a:t>
-            </a:r>
-            <a:r>
-              <a:rPr lang="en-US" sz="2200" dirty="0"/>
-              <a:t>).  This would help validate our version of the warehouse, and occasionally fill-in holes for requests not covered by our research-focused warehouse</a:t>
-            </a:r>
-            <a:r>
-              <a:rPr lang="en-US" sz="2200" dirty="0" smtClean="0"/>
-              <a:t>. </a:t>
-            </a:r>
-          </a:p>
-          <a:p>
-            <a:pPr marL="457200" lvl="1" indent="-457200">
-              <a:buFont typeface="+mj-lt"/>
-              <a:buAutoNum type="arabicPeriod"/>
-            </a:pPr>
-            <a:r>
-              <a:rPr lang="en-US" sz="2200" dirty="0" smtClean="0"/>
-              <a:t>Ticketing </a:t>
-            </a:r>
-            <a:r>
-              <a:rPr lang="en-US" sz="2200" dirty="0"/>
-              <a:t>system to manage incoming CRDW requests</a:t>
-            </a:r>
-          </a:p>
-          <a:p>
-            <a:pPr marL="457200" lvl="1" indent="-457200">
-              <a:buFont typeface="+mj-lt"/>
-              <a:buAutoNum type="arabicPeriod"/>
-            </a:pPr>
-            <a:r>
-              <a:rPr lang="en-US" sz="2200" dirty="0" smtClean="0"/>
-              <a:t>OMOP’s </a:t>
-            </a:r>
-            <a:r>
-              <a:rPr lang="en-US" sz="2200" dirty="0"/>
-              <a:t>Atlas Reporting Tool (</a:t>
-            </a:r>
-            <a:r>
-              <a:rPr lang="en-US" sz="2200" dirty="0">
-                <a:hlinkClick r:id="rId3"/>
-              </a:rPr>
-              <a:t>https://www.ohdsi.org/atlas-a-unified-interface-for-the-ohdsi-tools</a:t>
-            </a:r>
-            <a:r>
-              <a:rPr lang="en-US" sz="2200" dirty="0" smtClean="0">
-                <a:hlinkClick r:id="rId3"/>
-              </a:rPr>
-              <a:t>/</a:t>
-            </a:r>
-            <a:r>
-              <a:rPr lang="en-US" sz="2200" dirty="0" smtClean="0"/>
-              <a:t>) </a:t>
-            </a:r>
-            <a:endParaRPr lang="en-US" sz="2200" dirty="0"/>
-          </a:p>
-          <a:p>
-            <a:pPr marL="457200" lvl="1" indent="-457200">
-              <a:buFont typeface="+mj-lt"/>
-              <a:buAutoNum type="arabicPeriod"/>
-            </a:pPr>
-            <a:r>
-              <a:rPr lang="en-US" sz="2200" dirty="0" err="1"/>
-              <a:t>TriNetX</a:t>
-            </a:r>
-            <a:r>
-              <a:rPr lang="en-US" sz="2200" dirty="0"/>
-              <a:t> (</a:t>
-            </a:r>
-            <a:r>
-              <a:rPr lang="en-US" sz="2200" dirty="0">
-                <a:hlinkClick r:id="rId4"/>
-              </a:rPr>
-              <a:t>https://trinetx.com</a:t>
-            </a:r>
-            <a:r>
-              <a:rPr lang="en-US" sz="2200" dirty="0" smtClean="0">
-                <a:hlinkClick r:id="rId4"/>
-              </a:rPr>
-              <a:t>/</a:t>
-            </a:r>
-            <a:r>
-              <a:rPr lang="en-US" sz="2200" dirty="0" smtClean="0"/>
-              <a:t>)</a:t>
-            </a:r>
-            <a:endParaRPr lang="en-US" sz="2200" dirty="0"/>
-          </a:p>
-          <a:p>
-            <a:pPr marL="457200" lvl="1" indent="-457200">
-              <a:buFont typeface="+mj-lt"/>
-              <a:buAutoNum type="arabicPeriod"/>
-            </a:pPr>
-            <a:r>
-              <a:rPr lang="en-US" sz="2200" dirty="0"/>
-              <a:t>Spark (</a:t>
-            </a:r>
-            <a:r>
-              <a:rPr lang="en-US" sz="2200" dirty="0">
-                <a:hlinkClick r:id="rId5"/>
-              </a:rPr>
-              <a:t>https://spark.apache.org</a:t>
-            </a:r>
-            <a:r>
-              <a:rPr lang="en-US" sz="2200" dirty="0" smtClean="0">
-                <a:hlinkClick r:id="rId5"/>
-              </a:rPr>
-              <a:t>/</a:t>
-            </a:r>
-            <a:r>
-              <a:rPr lang="en-US" sz="2200" dirty="0" smtClean="0"/>
-              <a:t>)</a:t>
-            </a:r>
-          </a:p>
-          <a:p>
-            <a:pPr marL="457200" lvl="1" indent="-457200">
-              <a:buFontTx/>
-              <a:buChar char="-"/>
-            </a:pPr>
-            <a:endParaRPr lang="en-US" sz="2200" dirty="0" smtClean="0"/>
-          </a:p>
-          <a:p>
-            <a:pPr marL="457200" lvl="1" indent="-457200">
-              <a:buFontTx/>
-              <a:buChar char="-"/>
-            </a:pPr>
-            <a:r>
-              <a:rPr lang="en-US" sz="2200" dirty="0" smtClean="0"/>
-              <a:t>Completed:</a:t>
-            </a:r>
-            <a:endParaRPr lang="en-US" sz="2200" dirty="0"/>
-          </a:p>
-          <a:p>
-            <a:pPr marL="914400" lvl="2" indent="-457200">
-              <a:buFontTx/>
-              <a:buChar char="-"/>
-            </a:pPr>
-            <a:r>
-              <a:rPr lang="en-US" dirty="0">
+            <a:endParaRPr lang="en-US" dirty="0"/>
+          </a:p>
+          <a:p>
+            <a:pPr lvl="0"/>
+            <a:r>
+              <a:rPr lang="en-US" dirty="0"/>
+              <a:t>Only for a clearly defined research purpose (combined QI + research registry participation – e.g. NSQIP, TQIP, etc. -  should be handled by OUH)</a:t>
+            </a:r>
+          </a:p>
+          <a:p>
+            <a:pPr lvl="0"/>
+            <a:r>
+              <a:rPr lang="en-US" dirty="0" err="1"/>
+              <a:t>Deidentification</a:t>
+            </a:r>
+            <a:r>
+              <a:rPr lang="en-US" dirty="0"/>
+              <a:t> or limited data set</a:t>
+            </a:r>
+          </a:p>
+          <a:p>
+            <a:pPr lvl="0"/>
+            <a:r>
+              <a:rPr lang="en-US" dirty="0"/>
+              <a:t>Not-for-profit requirement of the business </a:t>
+            </a:r>
+            <a:r>
+              <a:rPr lang="en-US" dirty="0" smtClean="0"/>
+              <a:t>associate </a:t>
+            </a:r>
+            <a:r>
+              <a:rPr lang="en-US" dirty="0" smtClean="0">
                 <a:solidFill>
-                  <a:schemeClr val="bg1">
-                    <a:lumMod val="50000"/>
-                  </a:schemeClr>
+                  <a:schemeClr val="accent6"/>
                 </a:solidFill>
               </a:rPr>
-              <a:t>Meditech Compiled HTML </a:t>
-            </a:r>
-            <a:r>
-              <a:rPr lang="en-US" dirty="0" smtClean="0">
-                <a:solidFill>
-                  <a:schemeClr val="bg1">
-                    <a:lumMod val="50000"/>
-                  </a:schemeClr>
-                </a:solidFill>
-              </a:rPr>
-              <a:t>Help</a:t>
-            </a:r>
-            <a:endParaRPr lang="en-US" sz="2800" dirty="0"/>
+              <a:t>(Beasley doesn’t like this restriction)</a:t>
+            </a:r>
+            <a:endParaRPr lang="en-US" dirty="0">
+              <a:solidFill>
+                <a:schemeClr val="accent6"/>
+              </a:solidFill>
+            </a:endParaRPr>
+          </a:p>
+          <a:p>
+            <a:pPr marL="0" indent="0">
+              <a:buNone/>
+            </a:pPr>
+            <a:r>
+              <a:rPr lang="en-US" dirty="0"/>
+              <a:t> </a:t>
+            </a:r>
+          </a:p>
+          <a:p>
+            <a:pPr marL="0" indent="0">
+              <a:buNone/>
+            </a:pPr>
+            <a:r>
+              <a:rPr lang="en-US" dirty="0"/>
+              <a:t>Anything outside the stated review purview can still come to committee for recommendation before be passed to the OUH Leadership and data governance bodies </a:t>
+            </a:r>
+            <a:endParaRPr lang="en-US" sz="2800" dirty="0" smtClean="0"/>
           </a:p>
         </p:txBody>
       </p:sp>
     </p:spTree>
     <p:extLst>
       <p:ext uri="{BB962C8B-B14F-4D97-AF65-F5344CB8AC3E}">
-        <p14:creationId xmlns:p14="http://schemas.microsoft.com/office/powerpoint/2010/main" val="3479593431"/>
+        <p14:creationId xmlns:p14="http://schemas.microsoft.com/office/powerpoint/2010/main" val="1569038813"/>
       </p:ext>
     </p:extLst>
   </p:cSld>
@@ -19146,6 +19167,300 @@
         </p:nvSpPr>
         <p:spPr>
           <a:xfrm>
+            <a:off x="565151" y="70785"/>
+            <a:ext cx="10515600" cy="640416"/>
+          </a:xfrm>
+        </p:spPr>
+        <p:txBody>
+          <a:bodyPr>
+            <a:normAutofit/>
+          </a:bodyPr>
+          <a:lstStyle/>
+          <a:p>
+            <a:r>
+              <a:rPr lang="en-US" sz="3600" b="1" i="1" dirty="0" smtClean="0">
+                <a:solidFill>
+                  <a:srgbClr val="0070C0"/>
+                </a:solidFill>
+              </a:rPr>
+              <a:t>Requested Resources to Further Develop the CRDW</a:t>
+            </a:r>
+            <a:endParaRPr lang="en-US" sz="3600" b="1" i="1" dirty="0">
+              <a:solidFill>
+                <a:srgbClr val="0070C0"/>
+              </a:solidFill>
+            </a:endParaRPr>
+          </a:p>
+        </p:txBody>
+      </p:sp>
+      <p:sp>
+        <p:nvSpPr>
+          <p:cNvPr id="3" name="Content Placeholder 2"/>
+          <p:cNvSpPr>
+            <a:spLocks noGrp="1"/>
+          </p:cNvSpPr>
+          <p:nvPr>
+            <p:ph idx="1"/>
+          </p:nvPr>
+        </p:nvSpPr>
+        <p:spPr>
+          <a:xfrm>
+            <a:off x="565151" y="768351"/>
+            <a:ext cx="10814050" cy="5918200"/>
+          </a:xfrm>
+        </p:spPr>
+        <p:txBody>
+          <a:bodyPr>
+            <a:noAutofit/>
+          </a:bodyPr>
+          <a:lstStyle/>
+          <a:p>
+            <a:pPr marL="457200" lvl="1" indent="-457200">
+              <a:buFont typeface="+mj-lt"/>
+              <a:buAutoNum type="arabicPeriod"/>
+            </a:pPr>
+            <a:r>
+              <a:rPr lang="en-US" sz="2200" dirty="0"/>
+              <a:t>Ideally, IRB would implement a procedure to allow for CDRW upon initial approval without adding staff to KSP (e.g., a check-box on the application indicating use of CDRW to obtain data</a:t>
+            </a:r>
+            <a:r>
+              <a:rPr lang="en-US" sz="2200" dirty="0" smtClean="0"/>
+              <a:t>).</a:t>
+            </a:r>
+            <a:endParaRPr lang="en-US" sz="2200" dirty="0"/>
+          </a:p>
+          <a:p>
+            <a:pPr marL="457200" lvl="1" indent="-457200">
+              <a:buFont typeface="+mj-lt"/>
+              <a:buAutoNum type="arabicPeriod"/>
+            </a:pPr>
+            <a:r>
+              <a:rPr lang="en-US" sz="2200" dirty="0" smtClean="0"/>
+              <a:t>Routine meetings </a:t>
+            </a:r>
+            <a:r>
+              <a:rPr lang="en-US" sz="2200" dirty="0"/>
+              <a:t>with an OUM Clinical Information Specialist / Application Analyst (someone like Megan Posada</a:t>
+            </a:r>
+            <a:r>
+              <a:rPr lang="en-US" sz="2200" dirty="0" smtClean="0"/>
+              <a:t>). </a:t>
+            </a:r>
+            <a:endParaRPr lang="en-US" sz="2200" dirty="0"/>
+          </a:p>
+          <a:p>
+            <a:pPr marL="457200" lvl="1" indent="-457200">
+              <a:buFont typeface="+mj-lt"/>
+              <a:buAutoNum type="arabicPeriod"/>
+            </a:pPr>
+            <a:r>
+              <a:rPr lang="en-US" sz="2200" dirty="0"/>
+              <a:t>We would like read-only access to the other Meditech warehouse (being developed by </a:t>
+            </a:r>
+            <a:r>
+              <a:rPr lang="en-US" sz="2200" dirty="0" err="1"/>
+              <a:t>CereCore</a:t>
+            </a:r>
+            <a:r>
+              <a:rPr lang="en-US" sz="2200" dirty="0"/>
+              <a:t>).  This would help validate our version of the warehouse, and occasionally fill-in holes for requests not covered by our research-focused warehouse</a:t>
+            </a:r>
+            <a:r>
+              <a:rPr lang="en-US" sz="2200" dirty="0" smtClean="0"/>
+              <a:t>. </a:t>
+            </a:r>
+          </a:p>
+          <a:p>
+            <a:pPr marL="457200" lvl="1" indent="-457200">
+              <a:buFont typeface="+mj-lt"/>
+              <a:buAutoNum type="arabicPeriod"/>
+            </a:pPr>
+            <a:r>
+              <a:rPr lang="en-US" sz="2200" dirty="0" smtClean="0"/>
+              <a:t>Ticketing </a:t>
+            </a:r>
+            <a:r>
+              <a:rPr lang="en-US" sz="2200" dirty="0"/>
+              <a:t>system to manage incoming CRDW requests</a:t>
+            </a:r>
+          </a:p>
+          <a:p>
+            <a:pPr marL="457200" lvl="1" indent="-457200">
+              <a:buFont typeface="+mj-lt"/>
+              <a:buAutoNum type="arabicPeriod"/>
+            </a:pPr>
+            <a:r>
+              <a:rPr lang="en-US" sz="2200" dirty="0" smtClean="0"/>
+              <a:t>OMOP’s </a:t>
+            </a:r>
+            <a:r>
+              <a:rPr lang="en-US" sz="2200" dirty="0"/>
+              <a:t>Atlas Reporting Tool (</a:t>
+            </a:r>
+            <a:r>
+              <a:rPr lang="en-US" sz="2200" dirty="0">
+                <a:hlinkClick r:id="rId3"/>
+              </a:rPr>
+              <a:t>https://www.ohdsi.org/atlas-a-unified-interface-for-the-ohdsi-tools</a:t>
+            </a:r>
+            <a:r>
+              <a:rPr lang="en-US" sz="2200" dirty="0" smtClean="0">
+                <a:hlinkClick r:id="rId3"/>
+              </a:rPr>
+              <a:t>/</a:t>
+            </a:r>
+            <a:r>
+              <a:rPr lang="en-US" sz="2200" dirty="0" smtClean="0"/>
+              <a:t>) </a:t>
+            </a:r>
+            <a:endParaRPr lang="en-US" sz="2200" dirty="0"/>
+          </a:p>
+          <a:p>
+            <a:pPr marL="457200" lvl="1" indent="-457200">
+              <a:buFont typeface="+mj-lt"/>
+              <a:buAutoNum type="arabicPeriod"/>
+            </a:pPr>
+            <a:r>
+              <a:rPr lang="en-US" sz="2200" dirty="0" err="1"/>
+              <a:t>TriNetX</a:t>
+            </a:r>
+            <a:r>
+              <a:rPr lang="en-US" sz="2200" dirty="0"/>
+              <a:t> (</a:t>
+            </a:r>
+            <a:r>
+              <a:rPr lang="en-US" sz="2200" dirty="0">
+                <a:hlinkClick r:id="rId4"/>
+              </a:rPr>
+              <a:t>https://trinetx.com</a:t>
+            </a:r>
+            <a:r>
+              <a:rPr lang="en-US" sz="2200" dirty="0" smtClean="0">
+                <a:hlinkClick r:id="rId4"/>
+              </a:rPr>
+              <a:t>/</a:t>
+            </a:r>
+            <a:r>
+              <a:rPr lang="en-US" sz="2200" dirty="0" smtClean="0"/>
+              <a:t>)</a:t>
+            </a:r>
+            <a:endParaRPr lang="en-US" sz="2200" dirty="0"/>
+          </a:p>
+          <a:p>
+            <a:pPr marL="457200" lvl="1" indent="-457200">
+              <a:buFont typeface="+mj-lt"/>
+              <a:buAutoNum type="arabicPeriod"/>
+            </a:pPr>
+            <a:r>
+              <a:rPr lang="en-US" sz="2200" dirty="0"/>
+              <a:t>Spark (</a:t>
+            </a:r>
+            <a:r>
+              <a:rPr lang="en-US" sz="2200" dirty="0">
+                <a:hlinkClick r:id="rId5"/>
+              </a:rPr>
+              <a:t>https://spark.apache.org</a:t>
+            </a:r>
+            <a:r>
+              <a:rPr lang="en-US" sz="2200" dirty="0" smtClean="0">
+                <a:hlinkClick r:id="rId5"/>
+              </a:rPr>
+              <a:t>/</a:t>
+            </a:r>
+            <a:r>
+              <a:rPr lang="en-US" sz="2200" dirty="0" smtClean="0"/>
+              <a:t>)</a:t>
+            </a:r>
+          </a:p>
+          <a:p>
+            <a:pPr marL="457200" lvl="1" indent="-457200">
+              <a:buFontTx/>
+              <a:buChar char="-"/>
+            </a:pPr>
+            <a:endParaRPr lang="en-US" sz="2200" dirty="0" smtClean="0"/>
+          </a:p>
+          <a:p>
+            <a:pPr marL="457200" lvl="1" indent="-457200">
+              <a:buFontTx/>
+              <a:buChar char="-"/>
+            </a:pPr>
+            <a:r>
+              <a:rPr lang="en-US" sz="2200" dirty="0" smtClean="0"/>
+              <a:t>Completed:</a:t>
+            </a:r>
+            <a:endParaRPr lang="en-US" sz="2200" dirty="0"/>
+          </a:p>
+          <a:p>
+            <a:pPr marL="914400" lvl="2" indent="-457200">
+              <a:buFontTx/>
+              <a:buChar char="-"/>
+            </a:pPr>
+            <a:r>
+              <a:rPr lang="en-US" dirty="0">
+                <a:solidFill>
+                  <a:schemeClr val="bg1">
+                    <a:lumMod val="50000"/>
+                  </a:schemeClr>
+                </a:solidFill>
+              </a:rPr>
+              <a:t>Meditech Compiled HTML </a:t>
+            </a:r>
+            <a:r>
+              <a:rPr lang="en-US" dirty="0" smtClean="0">
+                <a:solidFill>
+                  <a:schemeClr val="bg1">
+                    <a:lumMod val="50000"/>
+                  </a:schemeClr>
+                </a:solidFill>
+              </a:rPr>
+              <a:t>Help</a:t>
+            </a:r>
+            <a:endParaRPr lang="en-US" sz="2800" dirty="0"/>
+          </a:p>
+        </p:txBody>
+      </p:sp>
+    </p:spTree>
+    <p:extLst>
+      <p:ext uri="{BB962C8B-B14F-4D97-AF65-F5344CB8AC3E}">
+        <p14:creationId xmlns:p14="http://schemas.microsoft.com/office/powerpoint/2010/main" val="3479593431"/>
+      </p:ext>
+    </p:extLst>
+  </p:cSld>
+  <p:clrMapOvr>
+    <a:masterClrMapping/>
+  </p:clrMapOvr>
+</p:sld>
+</file>
+
+<file path=ppt/slides/slide16.xml><?xml version="1.0" encoding="utf-8"?>
+<p:sld xmlns:a="http://schemas.openxmlformats.org/drawingml/2006/main" xmlns:r="http://schemas.openxmlformats.org/officeDocument/2006/relationships" xmlns:p="http://schemas.openxmlformats.org/presentationml/2006/main">
+  <p:cSld>
+    <p:spTree>
+      <p:nvGrpSpPr>
+        <p:cNvPr id="1" name=""/>
+        <p:cNvGrpSpPr/>
+        <p:nvPr/>
+      </p:nvGrpSpPr>
+      <p:grpSpPr>
+        <a:xfrm>
+          <a:off x="0" y="0"/>
+          <a:ext cx="0" cy="0"/>
+          <a:chOff x="0" y="0"/>
+          <a:chExt cx="0" cy="0"/>
+        </a:xfrm>
+      </p:grpSpPr>
+      <p:sp>
+        <p:nvSpPr>
+          <p:cNvPr id="2" name="Title 1"/>
+          <p:cNvSpPr>
+            <a:spLocks noGrp="1"/>
+          </p:cNvSpPr>
+          <p:nvPr>
+            <p:ph type="title"/>
+          </p:nvPr>
+        </p:nvSpPr>
+        <p:spPr>
+          <a:xfrm>
             <a:off x="793750" y="320675"/>
             <a:ext cx="10515600" cy="600075"/>
           </a:xfrm>
@@ -19389,7 +19704,7 @@
 </p:sld>
 </file>
 
-<file path=ppt/slides/slide16.xml><?xml version="1.0" encoding="utf-8"?>
+<file path=ppt/slides/slide17.xml><?xml version="1.0" encoding="utf-8"?>
 <p:sld xmlns:a="http://schemas.openxmlformats.org/drawingml/2006/main" xmlns:r="http://schemas.openxmlformats.org/officeDocument/2006/relationships" xmlns:p="http://schemas.openxmlformats.org/presentationml/2006/main">
   <p:cSld>
     <p:spTree>
@@ -19701,7 +20016,7 @@
 </p:sld>
 </file>
 
-<file path=ppt/slides/slide17.xml><?xml version="1.0" encoding="utf-8"?>
+<file path=ppt/slides/slide18.xml><?xml version="1.0" encoding="utf-8"?>
 <p:sld xmlns:a="http://schemas.openxmlformats.org/drawingml/2006/main" xmlns:r="http://schemas.openxmlformats.org/officeDocument/2006/relationships" xmlns:p="http://schemas.openxmlformats.org/presentationml/2006/main">
   <p:cSld>
     <p:spTree>
@@ -19886,7 +20201,7 @@
 </p:sld>
 </file>
 
-<file path=ppt/slides/slide18.xml><?xml version="1.0" encoding="utf-8"?>
+<file path=ppt/slides/slide19.xml><?xml version="1.0" encoding="utf-8"?>
 <p:sld xmlns:a="http://schemas.openxmlformats.org/drawingml/2006/main" xmlns:r="http://schemas.openxmlformats.org/officeDocument/2006/relationships" xmlns:p="http://schemas.openxmlformats.org/presentationml/2006/main">
   <p:cSld>
     <p:spTree>
@@ -20362,249 +20677,6 @@
 </p:sld>
 </file>
 
-<file path=ppt/slides/slide19.xml><?xml version="1.0" encoding="utf-8"?>
-<p:sld xmlns:a="http://schemas.openxmlformats.org/drawingml/2006/main" xmlns:r="http://schemas.openxmlformats.org/officeDocument/2006/relationships" xmlns:p="http://schemas.openxmlformats.org/presentationml/2006/main">
-  <p:cSld>
-    <p:spTree>
-      <p:nvGrpSpPr>
-        <p:cNvPr id="1" name=""/>
-        <p:cNvGrpSpPr/>
-        <p:nvPr/>
-      </p:nvGrpSpPr>
-      <p:grpSpPr>
-        <a:xfrm>
-          <a:off x="0" y="0"/>
-          <a:ext cx="0" cy="0"/>
-          <a:chOff x="0" y="0"/>
-          <a:chExt cx="0" cy="0"/>
-        </a:xfrm>
-      </p:grpSpPr>
-      <p:sp>
-        <p:nvSpPr>
-          <p:cNvPr id="3" name="Content Placeholder 2"/>
-          <p:cNvSpPr>
-            <a:spLocks noGrp="1"/>
-          </p:cNvSpPr>
-          <p:nvPr>
-            <p:ph idx="1"/>
-          </p:nvPr>
-        </p:nvSpPr>
-        <p:spPr>
-          <a:xfrm>
-            <a:off x="298383" y="882994"/>
-            <a:ext cx="8354410" cy="5795124"/>
-          </a:xfrm>
-        </p:spPr>
-        <p:txBody>
-          <a:bodyPr>
-            <a:normAutofit/>
-          </a:bodyPr>
-          <a:lstStyle/>
-          <a:p>
-            <a:r>
-              <a:rPr lang="en-US" dirty="0">
-                <a:solidFill>
-                  <a:srgbClr val="000000"/>
-                </a:solidFill>
-              </a:rPr>
-              <a:t>Pipeline</a:t>
-            </a:r>
-          </a:p>
-          <a:p>
-            <a:pPr lvl="1"/>
-            <a:r>
-              <a:rPr lang="en-US" dirty="0">
-                <a:solidFill>
-                  <a:srgbClr val="000000"/>
-                </a:solidFill>
-              </a:rPr>
-              <a:t>Text files are saved to OUM’s ftp server around 1am.</a:t>
-            </a:r>
-          </a:p>
-          <a:p>
-            <a:pPr lvl="1"/>
-            <a:r>
-              <a:rPr lang="en-US" dirty="0">
-                <a:solidFill>
-                  <a:srgbClr val="000000"/>
-                </a:solidFill>
-              </a:rPr>
-              <a:t>CRDW downloads, grooms, &amp; ingests them into the warehouse.</a:t>
-            </a:r>
-          </a:p>
-          <a:p>
-            <a:pPr lvl="1"/>
-            <a:r>
-              <a:rPr lang="en-US" dirty="0">
-                <a:solidFill>
-                  <a:srgbClr val="000000"/>
-                </a:solidFill>
-              </a:rPr>
-              <a:t>Data available by 5:30am every morning.</a:t>
-            </a:r>
-          </a:p>
-          <a:p>
-            <a:r>
-              <a:rPr lang="en-US" dirty="0">
-                <a:solidFill>
-                  <a:srgbClr val="000000"/>
-                </a:solidFill>
-              </a:rPr>
-              <a:t>Tables/views available: patient, visit, visit event, diagnosis, lab, operation, procedure, blood product, </a:t>
-            </a:r>
-            <a:r>
-              <a:rPr lang="en-US" dirty="0" err="1">
-                <a:solidFill>
-                  <a:srgbClr val="000000"/>
-                </a:solidFill>
-              </a:rPr>
-              <a:t>obs</a:t>
-            </a:r>
-            <a:r>
-              <a:rPr lang="en-US" dirty="0">
-                <a:solidFill>
-                  <a:srgbClr val="000000"/>
-                </a:solidFill>
-              </a:rPr>
-              <a:t>, order entry, &amp; medication.</a:t>
-            </a:r>
-          </a:p>
-          <a:p>
-            <a:r>
-              <a:rPr lang="en-US" dirty="0">
-                <a:solidFill>
-                  <a:srgbClr val="000000"/>
-                </a:solidFill>
-              </a:rPr>
-              <a:t>Tables to develop: images, room history</a:t>
-            </a:r>
-          </a:p>
-          <a:p>
-            <a:r>
-              <a:rPr lang="en-US" dirty="0">
-                <a:solidFill>
-                  <a:srgbClr val="000000"/>
-                </a:solidFill>
-              </a:rPr>
-              <a:t>Occasional requests still require the OUH BI Team</a:t>
-            </a:r>
-            <a:br>
-              <a:rPr lang="en-US" dirty="0">
-                <a:solidFill>
-                  <a:srgbClr val="000000"/>
-                </a:solidFill>
-              </a:rPr>
-            </a:br>
-            <a:r>
-              <a:rPr lang="en-US" dirty="0">
-                <a:solidFill>
-                  <a:srgbClr val="000000"/>
-                </a:solidFill>
-              </a:rPr>
-              <a:t>(for elements that aren’t frequently used in research)</a:t>
-            </a:r>
-          </a:p>
-          <a:p>
-            <a:r>
-              <a:rPr lang="en-US" dirty="0">
-                <a:solidFill>
-                  <a:srgbClr val="000000"/>
-                </a:solidFill>
-              </a:rPr>
-              <a:t>Role in the future Data Lake</a:t>
-            </a:r>
-          </a:p>
-        </p:txBody>
-      </p:sp>
-      <p:sp>
-        <p:nvSpPr>
-          <p:cNvPr id="4" name="Title 1"/>
-          <p:cNvSpPr txBox="1">
-            <a:spLocks/>
-          </p:cNvSpPr>
-          <p:nvPr/>
-        </p:nvSpPr>
-        <p:spPr>
-          <a:xfrm>
-            <a:off x="781050" y="78400"/>
-            <a:ext cx="10515600" cy="804594"/>
-          </a:xfrm>
-          <a:prstGeom prst="rect">
-            <a:avLst/>
-          </a:prstGeom>
-        </p:spPr>
-        <p:txBody>
-          <a:bodyPr vert="horz" lIns="91440" tIns="45720" rIns="91440" bIns="45720" rtlCol="0" anchor="ctr">
-            <a:normAutofit/>
-          </a:bodyPr>
-          <a:lstStyle>
-            <a:lvl1pPr algn="l" defTabSz="914400" rtl="0" eaLnBrk="1" latinLnBrk="0" hangingPunct="1">
-              <a:lnSpc>
-                <a:spcPct val="90000"/>
-              </a:lnSpc>
-              <a:spcBef>
-                <a:spcPct val="0"/>
-              </a:spcBef>
-              <a:buNone/>
-              <a:defRPr sz="4400" kern="1200">
-                <a:solidFill>
-                  <a:schemeClr val="tx1"/>
-                </a:solidFill>
-                <a:latin typeface="+mj-lt"/>
-                <a:ea typeface="+mj-ea"/>
-                <a:cs typeface="+mj-cs"/>
-              </a:defRPr>
-            </a:lvl1pPr>
-          </a:lstStyle>
-          <a:p>
-            <a:r>
-              <a:rPr lang="en-US" sz="3600" b="1" i="1" dirty="0">
-                <a:solidFill>
-                  <a:srgbClr val="0070C0"/>
-                </a:solidFill>
-              </a:rPr>
-              <a:t>Meditech in the CRDW</a:t>
-            </a:r>
-          </a:p>
-        </p:txBody>
-      </p:sp>
-      <p:pic>
-        <p:nvPicPr>
-          <p:cNvPr id="5" name="Picture 4"/>
-          <p:cNvPicPr>
-            <a:picLocks noChangeAspect="1"/>
-          </p:cNvPicPr>
-          <p:nvPr/>
-        </p:nvPicPr>
-        <p:blipFill>
-          <a:blip r:embed="rId2"/>
-          <a:stretch>
-            <a:fillRect/>
-          </a:stretch>
-        </p:blipFill>
-        <p:spPr>
-          <a:xfrm>
-            <a:off x="9252703" y="116500"/>
-            <a:ext cx="2043947" cy="6635750"/>
-          </a:xfrm>
-          <a:prstGeom prst="rect">
-            <a:avLst/>
-          </a:prstGeom>
-        </p:spPr>
-      </p:pic>
-    </p:spTree>
-    <p:extLst>
-      <p:ext uri="{BB962C8B-B14F-4D97-AF65-F5344CB8AC3E}">
-        <p14:creationId xmlns:p14="http://schemas.microsoft.com/office/powerpoint/2010/main" val="777035461"/>
-      </p:ext>
-    </p:extLst>
-  </p:cSld>
-  <p:clrMapOvr>
-    <a:masterClrMapping/>
-  </p:clrMapOvr>
-</p:sld>
-</file>
-
 <file path=ppt/slides/slide2.xml><?xml version="1.0" encoding="utf-8"?>
 <p:sld xmlns:a="http://schemas.openxmlformats.org/drawingml/2006/main" xmlns:r="http://schemas.openxmlformats.org/officeDocument/2006/relationships" xmlns:p="http://schemas.openxmlformats.org/presentationml/2006/main">
   <p:cSld>
@@ -21100,6 +21172,249 @@
       </p:grpSpPr>
       <p:sp>
         <p:nvSpPr>
+          <p:cNvPr id="3" name="Content Placeholder 2"/>
+          <p:cNvSpPr>
+            <a:spLocks noGrp="1"/>
+          </p:cNvSpPr>
+          <p:nvPr>
+            <p:ph idx="1"/>
+          </p:nvPr>
+        </p:nvSpPr>
+        <p:spPr>
+          <a:xfrm>
+            <a:off x="298383" y="882994"/>
+            <a:ext cx="8354410" cy="5795124"/>
+          </a:xfrm>
+        </p:spPr>
+        <p:txBody>
+          <a:bodyPr>
+            <a:normAutofit/>
+          </a:bodyPr>
+          <a:lstStyle/>
+          <a:p>
+            <a:r>
+              <a:rPr lang="en-US" dirty="0">
+                <a:solidFill>
+                  <a:srgbClr val="000000"/>
+                </a:solidFill>
+              </a:rPr>
+              <a:t>Pipeline</a:t>
+            </a:r>
+          </a:p>
+          <a:p>
+            <a:pPr lvl="1"/>
+            <a:r>
+              <a:rPr lang="en-US" dirty="0">
+                <a:solidFill>
+                  <a:srgbClr val="000000"/>
+                </a:solidFill>
+              </a:rPr>
+              <a:t>Text files are saved to OUM’s ftp server around 1am.</a:t>
+            </a:r>
+          </a:p>
+          <a:p>
+            <a:pPr lvl="1"/>
+            <a:r>
+              <a:rPr lang="en-US" dirty="0">
+                <a:solidFill>
+                  <a:srgbClr val="000000"/>
+                </a:solidFill>
+              </a:rPr>
+              <a:t>CRDW downloads, grooms, &amp; ingests them into the warehouse.</a:t>
+            </a:r>
+          </a:p>
+          <a:p>
+            <a:pPr lvl="1"/>
+            <a:r>
+              <a:rPr lang="en-US" dirty="0">
+                <a:solidFill>
+                  <a:srgbClr val="000000"/>
+                </a:solidFill>
+              </a:rPr>
+              <a:t>Data available by 5:30am every morning.</a:t>
+            </a:r>
+          </a:p>
+          <a:p>
+            <a:r>
+              <a:rPr lang="en-US" dirty="0">
+                <a:solidFill>
+                  <a:srgbClr val="000000"/>
+                </a:solidFill>
+              </a:rPr>
+              <a:t>Tables/views available: patient, visit, visit event, diagnosis, lab, operation, procedure, blood product, </a:t>
+            </a:r>
+            <a:r>
+              <a:rPr lang="en-US" dirty="0" err="1">
+                <a:solidFill>
+                  <a:srgbClr val="000000"/>
+                </a:solidFill>
+              </a:rPr>
+              <a:t>obs</a:t>
+            </a:r>
+            <a:r>
+              <a:rPr lang="en-US" dirty="0">
+                <a:solidFill>
+                  <a:srgbClr val="000000"/>
+                </a:solidFill>
+              </a:rPr>
+              <a:t>, order entry, &amp; medication.</a:t>
+            </a:r>
+          </a:p>
+          <a:p>
+            <a:r>
+              <a:rPr lang="en-US" dirty="0">
+                <a:solidFill>
+                  <a:srgbClr val="000000"/>
+                </a:solidFill>
+              </a:rPr>
+              <a:t>Tables to develop: images, room history</a:t>
+            </a:r>
+          </a:p>
+          <a:p>
+            <a:r>
+              <a:rPr lang="en-US" dirty="0">
+                <a:solidFill>
+                  <a:srgbClr val="000000"/>
+                </a:solidFill>
+              </a:rPr>
+              <a:t>Occasional requests still require the OUH BI Team</a:t>
+            </a:r>
+            <a:br>
+              <a:rPr lang="en-US" dirty="0">
+                <a:solidFill>
+                  <a:srgbClr val="000000"/>
+                </a:solidFill>
+              </a:rPr>
+            </a:br>
+            <a:r>
+              <a:rPr lang="en-US" dirty="0">
+                <a:solidFill>
+                  <a:srgbClr val="000000"/>
+                </a:solidFill>
+              </a:rPr>
+              <a:t>(for elements that aren’t frequently used in research)</a:t>
+            </a:r>
+          </a:p>
+          <a:p>
+            <a:r>
+              <a:rPr lang="en-US" dirty="0">
+                <a:solidFill>
+                  <a:srgbClr val="000000"/>
+                </a:solidFill>
+              </a:rPr>
+              <a:t>Role in the future Data Lake</a:t>
+            </a:r>
+          </a:p>
+        </p:txBody>
+      </p:sp>
+      <p:sp>
+        <p:nvSpPr>
+          <p:cNvPr id="4" name="Title 1"/>
+          <p:cNvSpPr txBox="1">
+            <a:spLocks/>
+          </p:cNvSpPr>
+          <p:nvPr/>
+        </p:nvSpPr>
+        <p:spPr>
+          <a:xfrm>
+            <a:off x="781050" y="78400"/>
+            <a:ext cx="10515600" cy="804594"/>
+          </a:xfrm>
+          <a:prstGeom prst="rect">
+            <a:avLst/>
+          </a:prstGeom>
+        </p:spPr>
+        <p:txBody>
+          <a:bodyPr vert="horz" lIns="91440" tIns="45720" rIns="91440" bIns="45720" rtlCol="0" anchor="ctr">
+            <a:normAutofit/>
+          </a:bodyPr>
+          <a:lstStyle>
+            <a:lvl1pPr algn="l" defTabSz="914400" rtl="0" eaLnBrk="1" latinLnBrk="0" hangingPunct="1">
+              <a:lnSpc>
+                <a:spcPct val="90000"/>
+              </a:lnSpc>
+              <a:spcBef>
+                <a:spcPct val="0"/>
+              </a:spcBef>
+              <a:buNone/>
+              <a:defRPr sz="4400" kern="1200">
+                <a:solidFill>
+                  <a:schemeClr val="tx1"/>
+                </a:solidFill>
+                <a:latin typeface="+mj-lt"/>
+                <a:ea typeface="+mj-ea"/>
+                <a:cs typeface="+mj-cs"/>
+              </a:defRPr>
+            </a:lvl1pPr>
+          </a:lstStyle>
+          <a:p>
+            <a:r>
+              <a:rPr lang="en-US" sz="3600" b="1" i="1" dirty="0">
+                <a:solidFill>
+                  <a:srgbClr val="0070C0"/>
+                </a:solidFill>
+              </a:rPr>
+              <a:t>Meditech in the CRDW</a:t>
+            </a:r>
+          </a:p>
+        </p:txBody>
+      </p:sp>
+      <p:pic>
+        <p:nvPicPr>
+          <p:cNvPr id="5" name="Picture 4"/>
+          <p:cNvPicPr>
+            <a:picLocks noChangeAspect="1"/>
+          </p:cNvPicPr>
+          <p:nvPr/>
+        </p:nvPicPr>
+        <p:blipFill>
+          <a:blip r:embed="rId2"/>
+          <a:stretch>
+            <a:fillRect/>
+          </a:stretch>
+        </p:blipFill>
+        <p:spPr>
+          <a:xfrm>
+            <a:off x="9252703" y="116500"/>
+            <a:ext cx="2043947" cy="6635750"/>
+          </a:xfrm>
+          <a:prstGeom prst="rect">
+            <a:avLst/>
+          </a:prstGeom>
+        </p:spPr>
+      </p:pic>
+    </p:spTree>
+    <p:extLst>
+      <p:ext uri="{BB962C8B-B14F-4D97-AF65-F5344CB8AC3E}">
+        <p14:creationId xmlns:p14="http://schemas.microsoft.com/office/powerpoint/2010/main" val="777035461"/>
+      </p:ext>
+    </p:extLst>
+  </p:cSld>
+  <p:clrMapOvr>
+    <a:masterClrMapping/>
+  </p:clrMapOvr>
+</p:sld>
+</file>
+
+<file path=ppt/slides/slide21.xml><?xml version="1.0" encoding="utf-8"?>
+<p:sld xmlns:a="http://schemas.openxmlformats.org/drawingml/2006/main" xmlns:r="http://schemas.openxmlformats.org/officeDocument/2006/relationships" xmlns:p="http://schemas.openxmlformats.org/presentationml/2006/main">
+  <p:cSld>
+    <p:spTree>
+      <p:nvGrpSpPr>
+        <p:cNvPr id="1" name=""/>
+        <p:cNvGrpSpPr/>
+        <p:nvPr/>
+      </p:nvGrpSpPr>
+      <p:grpSpPr>
+        <a:xfrm>
+          <a:off x="0" y="0"/>
+          <a:ext cx="0" cy="0"/>
+          <a:chOff x="0" y="0"/>
+          <a:chExt cx="0" cy="0"/>
+        </a:xfrm>
+      </p:grpSpPr>
+      <p:sp>
+        <p:nvSpPr>
           <p:cNvPr id="2" name="Title 1"/>
           <p:cNvSpPr>
             <a:spLocks noGrp="1"/>
@@ -21192,7 +21507,7 @@
 </p:sld>
 </file>
 
-<file path=ppt/slides/slide21.xml><?xml version="1.0" encoding="utf-8"?>
+<file path=ppt/slides/slide22.xml><?xml version="1.0" encoding="utf-8"?>
 <p:sld xmlns:a="http://schemas.openxmlformats.org/drawingml/2006/main" xmlns:r="http://schemas.openxmlformats.org/officeDocument/2006/relationships" xmlns:p="http://schemas.openxmlformats.org/presentationml/2006/main">
   <p:cSld>
     <p:spTree>
@@ -21372,7 +21687,7 @@
 </p:sld>
 </file>
 
-<file path=ppt/slides/slide22.xml><?xml version="1.0" encoding="utf-8"?>
+<file path=ppt/slides/slide23.xml><?xml version="1.0" encoding="utf-8"?>
 <p:sld xmlns:a="http://schemas.openxmlformats.org/drawingml/2006/main" xmlns:r="http://schemas.openxmlformats.org/officeDocument/2006/relationships" xmlns:p="http://schemas.openxmlformats.org/presentationml/2006/main">
   <p:cSld>
     <p:spTree>
@@ -21559,7 +21874,7 @@
 </p:sld>
 </file>
 
-<file path=ppt/slides/slide23.xml><?xml version="1.0" encoding="utf-8"?>
+<file path=ppt/slides/slide24.xml><?xml version="1.0" encoding="utf-8"?>
 <p:sld xmlns:a="http://schemas.openxmlformats.org/drawingml/2006/main" xmlns:r="http://schemas.openxmlformats.org/officeDocument/2006/relationships" xmlns:p="http://schemas.openxmlformats.org/presentationml/2006/main">
   <p:cSld>
     <p:spTree>
@@ -21744,7 +22059,7 @@
 </p:sld>
 </file>
 
-<file path=ppt/slides/slide24.xml><?xml version="1.0" encoding="utf-8"?>
+<file path=ppt/slides/slide25.xml><?xml version="1.0" encoding="utf-8"?>
 <p:sld xmlns:a="http://schemas.openxmlformats.org/drawingml/2006/main" xmlns:r="http://schemas.openxmlformats.org/officeDocument/2006/relationships" xmlns:p="http://schemas.openxmlformats.org/presentationml/2006/main">
   <p:cSld>
     <p:spTree>
@@ -22141,7 +22456,7 @@
 </p:sld>
 </file>
 
-<file path=ppt/slides/slide25.xml><?xml version="1.0" encoding="utf-8"?>
+<file path=ppt/slides/slide26.xml><?xml version="1.0" encoding="utf-8"?>
 <p:sld xmlns:a="http://schemas.openxmlformats.org/drawingml/2006/main" xmlns:r="http://schemas.openxmlformats.org/officeDocument/2006/relationships" xmlns:p="http://schemas.openxmlformats.org/presentationml/2006/main">
   <p:cSld>
     <p:bg>
@@ -22224,7 +22539,7 @@
 </p:sld>
 </file>
 
-<file path=ppt/slides/slide26.xml><?xml version="1.0" encoding="utf-8"?>
+<file path=ppt/slides/slide27.xml><?xml version="1.0" encoding="utf-8"?>
 <p:sld xmlns:a="http://schemas.openxmlformats.org/drawingml/2006/main" xmlns:r="http://schemas.openxmlformats.org/officeDocument/2006/relationships" xmlns:p="http://schemas.openxmlformats.org/presentationml/2006/main">
   <p:cSld>
     <p:spTree>

</xml_diff>